<commit_message>
UI Design|doc|System map, System process 작성
</commit_message>
<xml_diff>
--- a/doc/3_ 설계서/UI Design Template.pptx
+++ b/doc/3_ 설계서/UI Design Template.pptx
@@ -145,6 +145,41 @@
       </a:defRPr>
     </a:lvl9pPr>
   </p:defaultTextStyle>
+  <p:extLst>
+    <p:ext uri="{EFAFB233-063F-42B5-8137-9DF3F51BA10A}">
+      <p15:sldGuideLst xmlns:p15="http://schemas.microsoft.com/office/powerpoint/2012/main">
+        <p15:guide id="1" orient="horz">
+          <p15:clr>
+            <a:srgbClr val="A4A3A4"/>
+          </p15:clr>
+        </p15:guide>
+        <p15:guide id="2" pos="2880">
+          <p15:clr>
+            <a:srgbClr val="A4A3A4"/>
+          </p15:clr>
+        </p15:guide>
+        <p15:guide id="3" pos="6">
+          <p15:clr>
+            <a:srgbClr val="A4A3A4"/>
+          </p15:clr>
+        </p15:guide>
+      </p15:sldGuideLst>
+    </p:ext>
+    <p:ext uri="{2D200454-40CA-4A62-9FC3-DE9A4176ACB9}">
+      <p15:notesGuideLst xmlns:p15="http://schemas.microsoft.com/office/powerpoint/2012/main">
+        <p15:guide id="1" orient="horz" pos="3126">
+          <p15:clr>
+            <a:srgbClr val="A4A3A4"/>
+          </p15:clr>
+        </p15:guide>
+        <p15:guide id="2" pos="2140">
+          <p15:clr>
+            <a:srgbClr val="A4A3A4"/>
+          </p15:clr>
+        </p15:guide>
+      </p15:notesGuideLst>
+    </p:ext>
+  </p:extLst>
 </p:presentation>
 </file>
 
@@ -2311,14 +2346,14 @@
             <p:ph idx="1"/>
             <p:extLst>
               <p:ext uri="{D42A27DB-BD31-4B8C-83A1-F6EECF244321}">
-                <p14:modId xmlns:p14="http://schemas.microsoft.com/office/powerpoint/2010/main" val="3459876744"/>
+                <p14:modId xmlns:p14="http://schemas.microsoft.com/office/powerpoint/2010/main" val="3293853546"/>
               </p:ext>
             </p:extLst>
           </p:nvPr>
         </p:nvGraphicFramePr>
         <p:xfrm>
           <a:off x="280988" y="1025525"/>
-          <a:ext cx="8582024" cy="2966720"/>
+          <a:ext cx="8582024" cy="3053080"/>
         </p:xfrm>
         <a:graphic>
           <a:graphicData uri="http://schemas.openxmlformats.org/drawingml/2006/table">
@@ -2327,10 +2362,34 @@
                 <a:tableStyleId>{5940675A-B579-460E-94D1-54222C63F5DA}</a:tableStyleId>
               </a:tblPr>
               <a:tblGrid>
-                <a:gridCol w="2145506"/>
-                <a:gridCol w="2145506"/>
-                <a:gridCol w="2145506"/>
-                <a:gridCol w="2145506"/>
+                <a:gridCol w="2145506">
+                  <a:extLst>
+                    <a:ext uri="{9D8B030D-6E8A-4147-A177-3AD203B41FA5}">
+                      <a16:colId xmlns:a16="http://schemas.microsoft.com/office/drawing/2014/main" val="20000"/>
+                    </a:ext>
+                  </a:extLst>
+                </a:gridCol>
+                <a:gridCol w="2145506">
+                  <a:extLst>
+                    <a:ext uri="{9D8B030D-6E8A-4147-A177-3AD203B41FA5}">
+                      <a16:colId xmlns:a16="http://schemas.microsoft.com/office/drawing/2014/main" val="20001"/>
+                    </a:ext>
+                  </a:extLst>
+                </a:gridCol>
+                <a:gridCol w="2145506">
+                  <a:extLst>
+                    <a:ext uri="{9D8B030D-6E8A-4147-A177-3AD203B41FA5}">
+                      <a16:colId xmlns:a16="http://schemas.microsoft.com/office/drawing/2014/main" val="20002"/>
+                    </a:ext>
+                  </a:extLst>
+                </a:gridCol>
+                <a:gridCol w="2145506">
+                  <a:extLst>
+                    <a:ext uri="{9D8B030D-6E8A-4147-A177-3AD203B41FA5}">
+                      <a16:colId xmlns:a16="http://schemas.microsoft.com/office/drawing/2014/main" val="20003"/>
+                    </a:ext>
+                  </a:extLst>
+                </a:gridCol>
               </a:tblGrid>
               <a:tr h="370840">
                 <a:tc>
@@ -2453,6 +2512,11 @@
                     </a:solidFill>
                   </a:tcPr>
                 </a:tc>
+                <a:extLst>
+                  <a:ext uri="{0D108BD9-81ED-4DB2-BD59-A6C34878D82A}">
+                    <a16:rowId xmlns:a16="http://schemas.microsoft.com/office/drawing/2014/main" val="10000"/>
+                  </a:ext>
+                </a:extLst>
               </a:tr>
               <a:tr h="370840">
                 <a:tc>
@@ -2461,6 +2525,16 @@
                     <a:lstStyle/>
                     <a:p>
                       <a:pPr algn="ctr" latinLnBrk="1"/>
+                      <a:r>
+                        <a:rPr lang="en-US" altLang="ko-KR" sz="1200" b="0" dirty="0" smtClean="0">
+                          <a:solidFill>
+                            <a:schemeClr val="tx1"/>
+                          </a:solidFill>
+                          <a:latin typeface="맑은 고딕" pitchFamily="50" charset="-127"/>
+                          <a:ea typeface="맑은 고딕" pitchFamily="50" charset="-127"/>
+                        </a:rPr>
+                        <a:t>2017.05.17</a:t>
+                      </a:r>
                       <a:endParaRPr lang="ko-KR" altLang="en-US" sz="1200" b="0" dirty="0">
                         <a:solidFill>
                           <a:schemeClr val="tx1"/>
@@ -2482,6 +2556,16 @@
                     <a:lstStyle/>
                     <a:p>
                       <a:pPr algn="ctr" latinLnBrk="1"/>
+                      <a:r>
+                        <a:rPr lang="en-US" altLang="ko-KR" sz="1200" b="0" dirty="0" smtClean="0">
+                          <a:solidFill>
+                            <a:schemeClr val="tx1"/>
+                          </a:solidFill>
+                          <a:latin typeface="맑은 고딕" pitchFamily="50" charset="-127"/>
+                          <a:ea typeface="맑은 고딕" pitchFamily="50" charset="-127"/>
+                        </a:rPr>
+                        <a:t>V0.1.0</a:t>
+                      </a:r>
                       <a:endParaRPr lang="ko-KR" altLang="en-US" sz="1200" b="0" dirty="0">
                         <a:solidFill>
                           <a:schemeClr val="tx1"/>
@@ -2503,6 +2587,36 @@
                     <a:lstStyle/>
                     <a:p>
                       <a:pPr latinLnBrk="1"/>
+                      <a:r>
+                        <a:rPr lang="en-US" altLang="ko-KR" sz="1200" b="0" dirty="0" smtClean="0">
+                          <a:solidFill>
+                            <a:schemeClr val="tx1"/>
+                          </a:solidFill>
+                          <a:latin typeface="맑은 고딕" pitchFamily="50" charset="-127"/>
+                          <a:ea typeface="맑은 고딕" pitchFamily="50" charset="-127"/>
+                        </a:rPr>
+                        <a:t>System Map</a:t>
+                      </a:r>
+                      <a:r>
+                        <a:rPr lang="en-US" altLang="ko-KR" sz="1200" b="0" baseline="0" dirty="0" smtClean="0">
+                          <a:solidFill>
+                            <a:schemeClr val="tx1"/>
+                          </a:solidFill>
+                          <a:latin typeface="맑은 고딕" pitchFamily="50" charset="-127"/>
+                          <a:ea typeface="맑은 고딕" pitchFamily="50" charset="-127"/>
+                        </a:rPr>
+                        <a:t>, System Process </a:t>
+                      </a:r>
+                      <a:r>
+                        <a:rPr lang="ko-KR" altLang="en-US" sz="1200" b="0" baseline="0" dirty="0" smtClean="0">
+                          <a:solidFill>
+                            <a:schemeClr val="tx1"/>
+                          </a:solidFill>
+                          <a:latin typeface="맑은 고딕" pitchFamily="50" charset="-127"/>
+                          <a:ea typeface="맑은 고딕" pitchFamily="50" charset="-127"/>
+                        </a:rPr>
+                        <a:t>작성</a:t>
+                      </a:r>
                       <a:endParaRPr lang="ko-KR" altLang="en-US" sz="1200" b="0" dirty="0">
                         <a:solidFill>
                           <a:schemeClr val="tx1"/>
@@ -2524,6 +2638,16 @@
                     <a:lstStyle/>
                     <a:p>
                       <a:pPr algn="ctr" latinLnBrk="1"/>
+                      <a:r>
+                        <a:rPr lang="ko-KR" altLang="en-US" sz="1200" b="0" dirty="0" err="1" smtClean="0">
+                          <a:solidFill>
+                            <a:schemeClr val="tx1"/>
+                          </a:solidFill>
+                          <a:latin typeface="맑은 고딕" pitchFamily="50" charset="-127"/>
+                          <a:ea typeface="맑은 고딕" pitchFamily="50" charset="-127"/>
+                        </a:rPr>
+                        <a:t>김자훈</a:t>
+                      </a:r>
                       <a:endParaRPr lang="ko-KR" altLang="en-US" sz="1200" b="0" dirty="0">
                         <a:solidFill>
                           <a:schemeClr val="tx1"/>
@@ -2539,6 +2663,11 @@
                     </a:solidFill>
                   </a:tcPr>
                 </a:tc>
+                <a:extLst>
+                  <a:ext uri="{0D108BD9-81ED-4DB2-BD59-A6C34878D82A}">
+                    <a16:rowId xmlns:a16="http://schemas.microsoft.com/office/drawing/2014/main" val="10001"/>
+                  </a:ext>
+                </a:extLst>
               </a:tr>
               <a:tr h="370840">
                 <a:tc>
@@ -2625,6 +2754,11 @@
                     </a:solidFill>
                   </a:tcPr>
                 </a:tc>
+                <a:extLst>
+                  <a:ext uri="{0D108BD9-81ED-4DB2-BD59-A6C34878D82A}">
+                    <a16:rowId xmlns:a16="http://schemas.microsoft.com/office/drawing/2014/main" val="10002"/>
+                  </a:ext>
+                </a:extLst>
               </a:tr>
               <a:tr h="370840">
                 <a:tc>
@@ -2711,6 +2845,11 @@
                     </a:solidFill>
                   </a:tcPr>
                 </a:tc>
+                <a:extLst>
+                  <a:ext uri="{0D108BD9-81ED-4DB2-BD59-A6C34878D82A}">
+                    <a16:rowId xmlns:a16="http://schemas.microsoft.com/office/drawing/2014/main" val="10003"/>
+                  </a:ext>
+                </a:extLst>
               </a:tr>
               <a:tr h="370840">
                 <a:tc>
@@ -2797,6 +2936,11 @@
                     </a:solidFill>
                   </a:tcPr>
                 </a:tc>
+                <a:extLst>
+                  <a:ext uri="{0D108BD9-81ED-4DB2-BD59-A6C34878D82A}">
+                    <a16:rowId xmlns:a16="http://schemas.microsoft.com/office/drawing/2014/main" val="10004"/>
+                  </a:ext>
+                </a:extLst>
               </a:tr>
               <a:tr h="370840">
                 <a:tc>
@@ -2883,6 +3027,11 @@
                     </a:solidFill>
                   </a:tcPr>
                 </a:tc>
+                <a:extLst>
+                  <a:ext uri="{0D108BD9-81ED-4DB2-BD59-A6C34878D82A}">
+                    <a16:rowId xmlns:a16="http://schemas.microsoft.com/office/drawing/2014/main" val="10005"/>
+                  </a:ext>
+                </a:extLst>
               </a:tr>
               <a:tr h="370840">
                 <a:tc>
@@ -2969,6 +3118,11 @@
                     </a:solidFill>
                   </a:tcPr>
                 </a:tc>
+                <a:extLst>
+                  <a:ext uri="{0D108BD9-81ED-4DB2-BD59-A6C34878D82A}">
+                    <a16:rowId xmlns:a16="http://schemas.microsoft.com/office/drawing/2014/main" val="10006"/>
+                  </a:ext>
+                </a:extLst>
               </a:tr>
               <a:tr h="370840">
                 <a:tc>
@@ -3055,6 +3209,11 @@
                     </a:solidFill>
                   </a:tcPr>
                 </a:tc>
+                <a:extLst>
+                  <a:ext uri="{0D108BD9-81ED-4DB2-BD59-A6C34878D82A}">
+                    <a16:rowId xmlns:a16="http://schemas.microsoft.com/office/drawing/2014/main" val="10007"/>
+                  </a:ext>
+                </a:extLst>
               </a:tr>
             </a:tbl>
           </a:graphicData>
@@ -3111,6 +3270,77 @@
       </p:grpSpPr>
       <p:sp>
         <p:nvSpPr>
+          <p:cNvPr id="1054" name="직사각형 1053"/>
+          <p:cNvSpPr/>
+          <p:nvPr/>
+        </p:nvSpPr>
+        <p:spPr bwMode="auto">
+          <a:xfrm>
+            <a:off x="3802856" y="4358397"/>
+            <a:ext cx="5236972" cy="1562232"/>
+          </a:xfrm>
+          <a:prstGeom prst="rect">
+            <a:avLst/>
+          </a:prstGeom>
+          <a:ln w="38100">
+            <a:headEnd type="none" w="med" len="med"/>
+            <a:tailEnd type="none" w="med" len="med"/>
+          </a:ln>
+        </p:spPr>
+        <p:style>
+          <a:lnRef idx="2">
+            <a:schemeClr val="dk1"/>
+          </a:lnRef>
+          <a:fillRef idx="1">
+            <a:schemeClr val="lt1"/>
+          </a:fillRef>
+          <a:effectRef idx="0">
+            <a:schemeClr val="dk1"/>
+          </a:effectRef>
+          <a:fontRef idx="minor">
+            <a:schemeClr val="dk1"/>
+          </a:fontRef>
+        </p:style>
+        <p:txBody>
+          <a:bodyPr vert="horz" wrap="none" lIns="90000" tIns="46800" rIns="90000" bIns="46800" numCol="1" rtlCol="0" anchor="ctr" anchorCtr="0" compatLnSpc="1">
+            <a:prstTxWarp prst="textNoShape">
+              <a:avLst/>
+            </a:prstTxWarp>
+          </a:bodyPr>
+          <a:lstStyle/>
+          <a:p>
+            <a:pPr marL="0" marR="0" indent="0" algn="ctr" defTabSz="914400" rtl="0" eaLnBrk="0" fontAlgn="base" latinLnBrk="0" hangingPunct="0">
+              <a:lnSpc>
+                <a:spcPct val="100000"/>
+              </a:lnSpc>
+              <a:spcBef>
+                <a:spcPct val="0"/>
+              </a:spcBef>
+              <a:spcAft>
+                <a:spcPct val="0"/>
+              </a:spcAft>
+              <a:buClrTx/>
+              <a:buSzTx/>
+              <a:buFontTx/>
+              <a:buNone/>
+              <a:tabLst/>
+            </a:pPr>
+            <a:endParaRPr kumimoji="0" lang="ko-KR" altLang="en-US" sz="1400" b="0" i="0" u="none" strike="noStrike" cap="none" normalizeH="0" baseline="0" dirty="0" smtClean="0">
+              <a:ln>
+                <a:noFill/>
+              </a:ln>
+              <a:solidFill>
+                <a:schemeClr val="tx1"/>
+              </a:solidFill>
+              <a:effectLst/>
+              <a:latin typeface="맑은 고딕" pitchFamily="50" charset="-127"/>
+              <a:ea typeface="맑은 고딕" pitchFamily="50" charset="-127"/>
+            </a:endParaRPr>
+          </a:p>
+        </p:txBody>
+      </p:sp>
+      <p:sp>
+        <p:nvSpPr>
           <p:cNvPr id="2" name="제목 1"/>
           <p:cNvSpPr>
             <a:spLocks noGrp="1"/>
@@ -3132,45 +3362,6 @@
               <a:t>System Map</a:t>
             </a:r>
             <a:endParaRPr lang="ko-KR" altLang="en-US" b="1" dirty="0">
-              <a:latin typeface="맑은 고딕" pitchFamily="50" charset="-127"/>
-              <a:ea typeface="맑은 고딕" pitchFamily="50" charset="-127"/>
-            </a:endParaRPr>
-          </a:p>
-        </p:txBody>
-      </p:sp>
-      <p:sp>
-        <p:nvSpPr>
-          <p:cNvPr id="3" name="내용 개체 틀 2"/>
-          <p:cNvSpPr>
-            <a:spLocks noGrp="1"/>
-          </p:cNvSpPr>
-          <p:nvPr>
-            <p:ph idx="1"/>
-          </p:nvPr>
-        </p:nvSpPr>
-        <p:spPr/>
-        <p:txBody>
-          <a:bodyPr/>
-          <a:lstStyle/>
-          <a:p>
-            <a:pPr marL="0" indent="0">
-              <a:buNone/>
-            </a:pPr>
-            <a:r>
-              <a:rPr lang="ko-KR" altLang="en-US" dirty="0" smtClean="0">
-                <a:latin typeface="맑은 고딕" pitchFamily="50" charset="-127"/>
-                <a:ea typeface="맑은 고딕" pitchFamily="50" charset="-127"/>
-              </a:rPr>
-              <a:t>예제</a:t>
-            </a:r>
-            <a:r>
-              <a:rPr lang="en-US" altLang="ko-KR" dirty="0" smtClean="0">
-                <a:latin typeface="맑은 고딕" pitchFamily="50" charset="-127"/>
-                <a:ea typeface="맑은 고딕" pitchFamily="50" charset="-127"/>
-              </a:rPr>
-              <a:t>) </a:t>
-            </a:r>
-            <a:endParaRPr lang="ko-KR" altLang="en-US" dirty="0">
               <a:latin typeface="맑은 고딕" pitchFamily="50" charset="-127"/>
               <a:ea typeface="맑은 고딕" pitchFamily="50" charset="-127"/>
             </a:endParaRPr>
@@ -3201,47 +3392,1704 @@
           </a:p>
         </p:txBody>
       </p:sp>
-      <p:pic>
-        <p:nvPicPr>
-          <p:cNvPr id="1026" name="Picture 2" descr="site map template, site map example"/>
-          <p:cNvPicPr>
-            <a:picLocks noChangeAspect="1" noChangeArrowheads="1"/>
-          </p:cNvPicPr>
+      <p:sp>
+        <p:nvSpPr>
+          <p:cNvPr id="5" name="모서리가 둥근 직사각형 4"/>
+          <p:cNvSpPr/>
           <p:nvPr/>
-        </p:nvPicPr>
-        <p:blipFill>
-          <a:blip r:embed="rId2">
-            <a:extLst>
-              <a:ext uri="{28A0092B-C50C-407E-A947-70E740481C1C}">
-                <a14:useLocalDpi xmlns:a14="http://schemas.microsoft.com/office/drawing/2010/main" val="0"/>
-              </a:ext>
-            </a:extLst>
-          </a:blip>
-          <a:srcRect/>
-          <a:stretch>
-            <a:fillRect/>
-          </a:stretch>
-        </p:blipFill>
+        </p:nvSpPr>
         <p:spPr bwMode="auto">
           <a:xfrm>
-            <a:off x="2267138" y="1284656"/>
-            <a:ext cx="4609724" cy="5047752"/>
+            <a:off x="424873" y="1298646"/>
+            <a:ext cx="1099127" cy="665018"/>
+          </a:xfrm>
+          <a:prstGeom prst="roundRect">
+            <a:avLst/>
+          </a:prstGeom>
+          <a:solidFill>
+            <a:srgbClr val="0070C0"/>
+          </a:solidFill>
+          <a:ln>
+            <a:solidFill>
+              <a:srgbClr val="000099"/>
+            </a:solidFill>
+            <a:headEnd type="none" w="med" len="med"/>
+            <a:tailEnd type="none" w="med" len="med"/>
+          </a:ln>
+        </p:spPr>
+        <p:style>
+          <a:lnRef idx="2">
+            <a:schemeClr val="accent1"/>
+          </a:lnRef>
+          <a:fillRef idx="1">
+            <a:schemeClr val="lt1"/>
+          </a:fillRef>
+          <a:effectRef idx="0">
+            <a:schemeClr val="accent1"/>
+          </a:effectRef>
+          <a:fontRef idx="minor">
+            <a:schemeClr val="dk1"/>
+          </a:fontRef>
+        </p:style>
+        <p:txBody>
+          <a:bodyPr vert="horz" wrap="none" lIns="90000" tIns="46800" rIns="90000" bIns="46800" numCol="1" rtlCol="0" anchor="ctr" anchorCtr="0" compatLnSpc="1">
+            <a:prstTxWarp prst="textNoShape">
+              <a:avLst/>
+            </a:prstTxWarp>
+          </a:bodyPr>
+          <a:lstStyle/>
+          <a:p>
+            <a:pPr marL="0" marR="0" indent="0" algn="ctr" defTabSz="914400" rtl="0" eaLnBrk="0" fontAlgn="base" latinLnBrk="0" hangingPunct="0">
+              <a:lnSpc>
+                <a:spcPct val="100000"/>
+              </a:lnSpc>
+              <a:spcBef>
+                <a:spcPct val="0"/>
+              </a:spcBef>
+              <a:spcAft>
+                <a:spcPct val="0"/>
+              </a:spcAft>
+              <a:buClrTx/>
+              <a:buSzTx/>
+              <a:buFontTx/>
+              <a:buNone/>
+              <a:tabLst/>
+            </a:pPr>
+            <a:r>
+              <a:rPr lang="en-US" altLang="ko-KR" b="1" dirty="0" smtClean="0">
+                <a:solidFill>
+                  <a:schemeClr val="bg1"/>
+                </a:solidFill>
+                <a:latin typeface="Goudy Old Style" panose="02020502050305020303" pitchFamily="18" charset="0"/>
+                <a:ea typeface="맑은 고딕" pitchFamily="50" charset="-127"/>
+              </a:rPr>
+              <a:t>To do List</a:t>
+            </a:r>
+            <a:endParaRPr kumimoji="0" lang="ko-KR" altLang="en-US" sz="1400" b="1" i="0" u="none" strike="noStrike" cap="none" normalizeH="0" baseline="0" dirty="0" smtClean="0">
+              <a:solidFill>
+                <a:schemeClr val="bg1"/>
+              </a:solidFill>
+              <a:effectLst/>
+              <a:latin typeface="Goudy Old Style" panose="02020502050305020303" pitchFamily="18" charset="0"/>
+              <a:ea typeface="맑은 고딕" pitchFamily="50" charset="-127"/>
+            </a:endParaRPr>
+          </a:p>
+        </p:txBody>
+      </p:sp>
+      <p:sp>
+        <p:nvSpPr>
+          <p:cNvPr id="8" name="모서리가 둥근 직사각형 7"/>
+          <p:cNvSpPr/>
+          <p:nvPr/>
+        </p:nvSpPr>
+        <p:spPr bwMode="auto">
+          <a:xfrm>
+            <a:off x="4081067" y="1963664"/>
+            <a:ext cx="1099127" cy="665018"/>
+          </a:xfrm>
+          <a:prstGeom prst="roundRect">
+            <a:avLst/>
+          </a:prstGeom>
+          <a:solidFill>
+            <a:srgbClr val="0070C0"/>
+          </a:solidFill>
+          <a:ln w="38100">
+            <a:solidFill>
+              <a:srgbClr val="000099"/>
+            </a:solidFill>
+            <a:headEnd type="none" w="med" len="med"/>
+            <a:tailEnd type="none" w="med" len="med"/>
+          </a:ln>
+        </p:spPr>
+        <p:style>
+          <a:lnRef idx="2">
+            <a:schemeClr val="accent1"/>
+          </a:lnRef>
+          <a:fillRef idx="1">
+            <a:schemeClr val="lt1"/>
+          </a:fillRef>
+          <a:effectRef idx="0">
+            <a:schemeClr val="accent1"/>
+          </a:effectRef>
+          <a:fontRef idx="minor">
+            <a:schemeClr val="dk1"/>
+          </a:fontRef>
+        </p:style>
+        <p:txBody>
+          <a:bodyPr vert="horz" wrap="none" lIns="90000" tIns="46800" rIns="90000" bIns="46800" numCol="1" rtlCol="0" anchor="ctr" anchorCtr="0" compatLnSpc="1">
+            <a:prstTxWarp prst="textNoShape">
+              <a:avLst/>
+            </a:prstTxWarp>
+          </a:bodyPr>
+          <a:lstStyle/>
+          <a:p>
+            <a:pPr marL="0" marR="0" indent="0" algn="ctr" defTabSz="914400" rtl="0" eaLnBrk="0" fontAlgn="base" latinLnBrk="0" hangingPunct="0">
+              <a:lnSpc>
+                <a:spcPct val="100000"/>
+              </a:lnSpc>
+              <a:spcBef>
+                <a:spcPct val="0"/>
+              </a:spcBef>
+              <a:spcAft>
+                <a:spcPct val="0"/>
+              </a:spcAft>
+              <a:buClrTx/>
+              <a:buSzTx/>
+              <a:buFontTx/>
+              <a:buNone/>
+              <a:tabLst/>
+            </a:pPr>
+            <a:r>
+              <a:rPr lang="ko-KR" altLang="en-US" b="1" dirty="0" smtClean="0">
+                <a:solidFill>
+                  <a:schemeClr val="bg1"/>
+                </a:solidFill>
+                <a:latin typeface="Goudy Old Style" panose="02020502050305020303" pitchFamily="18" charset="0"/>
+                <a:ea typeface="맑은 고딕" pitchFamily="50" charset="-127"/>
+              </a:rPr>
+              <a:t>과목 추가</a:t>
+            </a:r>
+            <a:endParaRPr kumimoji="0" lang="ko-KR" altLang="en-US" sz="1400" b="1" i="0" u="none" strike="noStrike" cap="none" normalizeH="0" baseline="0" dirty="0" smtClean="0">
+              <a:solidFill>
+                <a:schemeClr val="bg1"/>
+              </a:solidFill>
+              <a:effectLst/>
+              <a:latin typeface="Goudy Old Style" panose="02020502050305020303" pitchFamily="18" charset="0"/>
+              <a:ea typeface="맑은 고딕" pitchFamily="50" charset="-127"/>
+            </a:endParaRPr>
+          </a:p>
+        </p:txBody>
+      </p:sp>
+      <p:sp>
+        <p:nvSpPr>
+          <p:cNvPr id="9" name="모서리가 둥근 직사각형 8"/>
+          <p:cNvSpPr/>
+          <p:nvPr/>
+        </p:nvSpPr>
+        <p:spPr bwMode="auto">
+          <a:xfrm>
+            <a:off x="7737261" y="1963664"/>
+            <a:ext cx="1099127" cy="665018"/>
+          </a:xfrm>
+          <a:prstGeom prst="roundRect">
+            <a:avLst/>
+          </a:prstGeom>
+          <a:solidFill>
+            <a:srgbClr val="0070C0"/>
+          </a:solidFill>
+          <a:ln w="38100">
+            <a:solidFill>
+              <a:srgbClr val="000099"/>
+            </a:solidFill>
+            <a:headEnd type="none" w="med" len="med"/>
+            <a:tailEnd type="none" w="med" len="med"/>
+          </a:ln>
+        </p:spPr>
+        <p:style>
+          <a:lnRef idx="2">
+            <a:schemeClr val="accent1"/>
+          </a:lnRef>
+          <a:fillRef idx="1">
+            <a:schemeClr val="lt1"/>
+          </a:fillRef>
+          <a:effectRef idx="0">
+            <a:schemeClr val="accent1"/>
+          </a:effectRef>
+          <a:fontRef idx="minor">
+            <a:schemeClr val="dk1"/>
+          </a:fontRef>
+        </p:style>
+        <p:txBody>
+          <a:bodyPr vert="horz" wrap="none" lIns="90000" tIns="46800" rIns="90000" bIns="46800" numCol="1" rtlCol="0" anchor="ctr" anchorCtr="0" compatLnSpc="1">
+            <a:prstTxWarp prst="textNoShape">
+              <a:avLst/>
+            </a:prstTxWarp>
+          </a:bodyPr>
+          <a:lstStyle/>
+          <a:p>
+            <a:pPr marL="0" marR="0" indent="0" algn="ctr" defTabSz="914400" rtl="0" eaLnBrk="0" fontAlgn="base" latinLnBrk="0" hangingPunct="0">
+              <a:lnSpc>
+                <a:spcPct val="100000"/>
+              </a:lnSpc>
+              <a:spcBef>
+                <a:spcPct val="0"/>
+              </a:spcBef>
+              <a:spcAft>
+                <a:spcPct val="0"/>
+              </a:spcAft>
+              <a:buClrTx/>
+              <a:buSzTx/>
+              <a:buFontTx/>
+              <a:buNone/>
+              <a:tabLst/>
+            </a:pPr>
+            <a:r>
+              <a:rPr lang="ko-KR" altLang="en-US" b="1" dirty="0" smtClean="0">
+                <a:solidFill>
+                  <a:schemeClr val="bg1"/>
+                </a:solidFill>
+                <a:latin typeface="Goudy Old Style" panose="02020502050305020303" pitchFamily="18" charset="0"/>
+                <a:ea typeface="맑은 고딕" pitchFamily="50" charset="-127"/>
+              </a:rPr>
+              <a:t>과목 삭제</a:t>
+            </a:r>
+            <a:endParaRPr kumimoji="0" lang="ko-KR" altLang="en-US" sz="1400" b="1" i="0" u="none" strike="noStrike" cap="none" normalizeH="0" baseline="0" dirty="0" smtClean="0">
+              <a:solidFill>
+                <a:schemeClr val="bg1"/>
+              </a:solidFill>
+              <a:effectLst/>
+              <a:latin typeface="Goudy Old Style" panose="02020502050305020303" pitchFamily="18" charset="0"/>
+              <a:ea typeface="맑은 고딕" pitchFamily="50" charset="-127"/>
+            </a:endParaRPr>
+          </a:p>
+        </p:txBody>
+      </p:sp>
+      <p:sp>
+        <p:nvSpPr>
+          <p:cNvPr id="10" name="모서리가 둥근 직사각형 9"/>
+          <p:cNvSpPr/>
+          <p:nvPr/>
+        </p:nvSpPr>
+        <p:spPr bwMode="auto">
+          <a:xfrm>
+            <a:off x="5909167" y="3362973"/>
+            <a:ext cx="1099127" cy="665018"/>
+          </a:xfrm>
+          <a:prstGeom prst="roundRect">
+            <a:avLst/>
+          </a:prstGeom>
+          <a:solidFill>
+            <a:srgbClr val="0070C0"/>
+          </a:solidFill>
+          <a:ln w="38100">
+            <a:solidFill>
+              <a:srgbClr val="000099"/>
+            </a:solidFill>
+            <a:headEnd type="none" w="med" len="med"/>
+            <a:tailEnd type="none" w="med" len="med"/>
+          </a:ln>
+        </p:spPr>
+        <p:style>
+          <a:lnRef idx="2">
+            <a:schemeClr val="accent1"/>
+          </a:lnRef>
+          <a:fillRef idx="1">
+            <a:schemeClr val="lt1"/>
+          </a:fillRef>
+          <a:effectRef idx="0">
+            <a:schemeClr val="accent1"/>
+          </a:effectRef>
+          <a:fontRef idx="minor">
+            <a:schemeClr val="dk1"/>
+          </a:fontRef>
+        </p:style>
+        <p:txBody>
+          <a:bodyPr vert="horz" wrap="none" lIns="90000" tIns="46800" rIns="90000" bIns="46800" numCol="1" rtlCol="0" anchor="ctr" anchorCtr="0" compatLnSpc="1">
+            <a:prstTxWarp prst="textNoShape">
+              <a:avLst/>
+            </a:prstTxWarp>
+          </a:bodyPr>
+          <a:lstStyle/>
+          <a:p>
+            <a:pPr marL="0" marR="0" indent="0" algn="ctr" defTabSz="914400" rtl="0" eaLnBrk="0" fontAlgn="base" latinLnBrk="0" hangingPunct="0">
+              <a:lnSpc>
+                <a:spcPct val="100000"/>
+              </a:lnSpc>
+              <a:spcBef>
+                <a:spcPct val="0"/>
+              </a:spcBef>
+              <a:spcAft>
+                <a:spcPct val="0"/>
+              </a:spcAft>
+              <a:buClrTx/>
+              <a:buSzTx/>
+              <a:buFontTx/>
+              <a:buNone/>
+              <a:tabLst/>
+            </a:pPr>
+            <a:r>
+              <a:rPr lang="en-US" altLang="ko-KR" b="1" dirty="0" smtClean="0">
+                <a:solidFill>
+                  <a:schemeClr val="bg1"/>
+                </a:solidFill>
+                <a:latin typeface="Goudy Old Style" panose="02020502050305020303" pitchFamily="18" charset="0"/>
+                <a:ea typeface="맑은 고딕" pitchFamily="50" charset="-127"/>
+              </a:rPr>
+              <a:t>To do </a:t>
+            </a:r>
+            <a:r>
+              <a:rPr lang="ko-KR" altLang="en-US" b="1" dirty="0" smtClean="0">
+                <a:solidFill>
+                  <a:schemeClr val="bg1"/>
+                </a:solidFill>
+                <a:latin typeface="Goudy Old Style" panose="02020502050305020303" pitchFamily="18" charset="0"/>
+                <a:ea typeface="맑은 고딕" pitchFamily="50" charset="-127"/>
+              </a:rPr>
+              <a:t>변경</a:t>
+            </a:r>
+            <a:endParaRPr kumimoji="0" lang="ko-KR" altLang="en-US" sz="1400" b="1" i="0" u="none" strike="noStrike" cap="none" normalizeH="0" baseline="0" dirty="0" smtClean="0">
+              <a:solidFill>
+                <a:schemeClr val="bg1"/>
+              </a:solidFill>
+              <a:effectLst/>
+              <a:latin typeface="Goudy Old Style" panose="02020502050305020303" pitchFamily="18" charset="0"/>
+              <a:ea typeface="맑은 고딕" pitchFamily="50" charset="-127"/>
+            </a:endParaRPr>
+          </a:p>
+        </p:txBody>
+      </p:sp>
+      <p:sp>
+        <p:nvSpPr>
+          <p:cNvPr id="11" name="모서리가 둥근 직사각형 10"/>
+          <p:cNvSpPr/>
+          <p:nvPr/>
+        </p:nvSpPr>
+        <p:spPr bwMode="auto">
+          <a:xfrm>
+            <a:off x="2252970" y="2697955"/>
+            <a:ext cx="1099127" cy="665018"/>
+          </a:xfrm>
+          <a:prstGeom prst="roundRect">
+            <a:avLst/>
+          </a:prstGeom>
+          <a:solidFill>
+            <a:srgbClr val="0070C0"/>
+          </a:solidFill>
+          <a:ln w="38100">
+            <a:solidFill>
+              <a:srgbClr val="000099"/>
+            </a:solidFill>
+            <a:headEnd type="none" w="med" len="med"/>
+            <a:tailEnd type="none" w="med" len="med"/>
+          </a:ln>
+        </p:spPr>
+        <p:style>
+          <a:lnRef idx="2">
+            <a:schemeClr val="accent1"/>
+          </a:lnRef>
+          <a:fillRef idx="1">
+            <a:schemeClr val="lt1"/>
+          </a:fillRef>
+          <a:effectRef idx="0">
+            <a:schemeClr val="accent1"/>
+          </a:effectRef>
+          <a:fontRef idx="minor">
+            <a:schemeClr val="dk1"/>
+          </a:fontRef>
+        </p:style>
+        <p:txBody>
+          <a:bodyPr vert="horz" wrap="none" lIns="90000" tIns="46800" rIns="90000" bIns="46800" numCol="1" rtlCol="0" anchor="ctr" anchorCtr="0" compatLnSpc="1">
+            <a:prstTxWarp prst="textNoShape">
+              <a:avLst/>
+            </a:prstTxWarp>
+          </a:bodyPr>
+          <a:lstStyle/>
+          <a:p>
+            <a:pPr marL="0" marR="0" indent="0" algn="ctr" defTabSz="914400" rtl="0" eaLnBrk="0" fontAlgn="base" latinLnBrk="0" hangingPunct="0">
+              <a:lnSpc>
+                <a:spcPct val="100000"/>
+              </a:lnSpc>
+              <a:spcBef>
+                <a:spcPct val="0"/>
+              </a:spcBef>
+              <a:spcAft>
+                <a:spcPct val="0"/>
+              </a:spcAft>
+              <a:buClrTx/>
+              <a:buSzTx/>
+              <a:buFontTx/>
+              <a:buNone/>
+              <a:tabLst/>
+            </a:pPr>
+            <a:r>
+              <a:rPr lang="en-US" altLang="ko-KR" b="1" dirty="0" smtClean="0">
+                <a:solidFill>
+                  <a:schemeClr val="bg1"/>
+                </a:solidFill>
+                <a:latin typeface="Goudy Old Style" panose="02020502050305020303" pitchFamily="18" charset="0"/>
+                <a:ea typeface="맑은 고딕" pitchFamily="50" charset="-127"/>
+              </a:rPr>
+              <a:t>To do </a:t>
+            </a:r>
+            <a:r>
+              <a:rPr lang="ko-KR" altLang="en-US" b="1" dirty="0" smtClean="0">
+                <a:solidFill>
+                  <a:schemeClr val="bg1"/>
+                </a:solidFill>
+                <a:latin typeface="Goudy Old Style" panose="02020502050305020303" pitchFamily="18" charset="0"/>
+                <a:ea typeface="맑은 고딕" pitchFamily="50" charset="-127"/>
+              </a:rPr>
+              <a:t>관리</a:t>
+            </a:r>
+            <a:endParaRPr kumimoji="0" lang="ko-KR" altLang="en-US" sz="1400" b="1" i="0" u="none" strike="noStrike" cap="none" normalizeH="0" baseline="0" dirty="0" smtClean="0">
+              <a:solidFill>
+                <a:schemeClr val="bg1"/>
+              </a:solidFill>
+              <a:effectLst/>
+              <a:latin typeface="Goudy Old Style" panose="02020502050305020303" pitchFamily="18" charset="0"/>
+              <a:ea typeface="맑은 고딕" pitchFamily="50" charset="-127"/>
+            </a:endParaRPr>
+          </a:p>
+        </p:txBody>
+      </p:sp>
+      <p:sp>
+        <p:nvSpPr>
+          <p:cNvPr id="12" name="모서리가 둥근 직사각형 11"/>
+          <p:cNvSpPr/>
+          <p:nvPr/>
+        </p:nvSpPr>
+        <p:spPr bwMode="auto">
+          <a:xfrm>
+            <a:off x="2252971" y="1298646"/>
+            <a:ext cx="1099127" cy="665018"/>
+          </a:xfrm>
+          <a:prstGeom prst="roundRect">
+            <a:avLst/>
+          </a:prstGeom>
+          <a:solidFill>
+            <a:srgbClr val="0070C0"/>
+          </a:solidFill>
+          <a:ln w="38100">
+            <a:solidFill>
+              <a:srgbClr val="000099"/>
+            </a:solidFill>
+            <a:headEnd type="none" w="med" len="med"/>
+            <a:tailEnd type="none" w="med" len="med"/>
+          </a:ln>
+        </p:spPr>
+        <p:style>
+          <a:lnRef idx="2">
+            <a:schemeClr val="accent1"/>
+          </a:lnRef>
+          <a:fillRef idx="1">
+            <a:schemeClr val="lt1"/>
+          </a:fillRef>
+          <a:effectRef idx="0">
+            <a:schemeClr val="accent1"/>
+          </a:effectRef>
+          <a:fontRef idx="minor">
+            <a:schemeClr val="dk1"/>
+          </a:fontRef>
+        </p:style>
+        <p:txBody>
+          <a:bodyPr vert="horz" wrap="none" lIns="90000" tIns="46800" rIns="90000" bIns="46800" numCol="1" rtlCol="0" anchor="ctr" anchorCtr="0" compatLnSpc="1">
+            <a:prstTxWarp prst="textNoShape">
+              <a:avLst/>
+            </a:prstTxWarp>
+          </a:bodyPr>
+          <a:lstStyle/>
+          <a:p>
+            <a:pPr marL="0" marR="0" indent="0" algn="ctr" defTabSz="914400" rtl="0" eaLnBrk="0" fontAlgn="base" latinLnBrk="0" hangingPunct="0">
+              <a:lnSpc>
+                <a:spcPct val="100000"/>
+              </a:lnSpc>
+              <a:spcBef>
+                <a:spcPct val="0"/>
+              </a:spcBef>
+              <a:spcAft>
+                <a:spcPct val="0"/>
+              </a:spcAft>
+              <a:buClrTx/>
+              <a:buSzTx/>
+              <a:buFontTx/>
+              <a:buNone/>
+              <a:tabLst/>
+            </a:pPr>
+            <a:r>
+              <a:rPr lang="ko-KR" altLang="en-US" b="1" dirty="0" smtClean="0">
+                <a:solidFill>
+                  <a:schemeClr val="bg1"/>
+                </a:solidFill>
+                <a:latin typeface="Goudy Old Style" panose="02020502050305020303" pitchFamily="18" charset="0"/>
+                <a:ea typeface="맑은 고딕" pitchFamily="50" charset="-127"/>
+              </a:rPr>
+              <a:t>과목 관리</a:t>
+            </a:r>
+            <a:endParaRPr kumimoji="0" lang="ko-KR" altLang="en-US" sz="1400" b="1" i="0" u="none" strike="noStrike" cap="none" normalizeH="0" baseline="0" dirty="0" smtClean="0">
+              <a:solidFill>
+                <a:schemeClr val="bg1"/>
+              </a:solidFill>
+              <a:effectLst/>
+              <a:latin typeface="Goudy Old Style" panose="02020502050305020303" pitchFamily="18" charset="0"/>
+              <a:ea typeface="맑은 고딕" pitchFamily="50" charset="-127"/>
+            </a:endParaRPr>
+          </a:p>
+        </p:txBody>
+      </p:sp>
+      <p:sp>
+        <p:nvSpPr>
+          <p:cNvPr id="13" name="모서리가 둥근 직사각형 12"/>
+          <p:cNvSpPr/>
+          <p:nvPr/>
+        </p:nvSpPr>
+        <p:spPr bwMode="auto">
+          <a:xfrm>
+            <a:off x="2252969" y="4097264"/>
+            <a:ext cx="1099127" cy="665018"/>
+          </a:xfrm>
+          <a:prstGeom prst="roundRect">
+            <a:avLst/>
+          </a:prstGeom>
+          <a:solidFill>
+            <a:srgbClr val="0070C0"/>
+          </a:solidFill>
+          <a:ln w="38100">
+            <a:solidFill>
+              <a:srgbClr val="000099"/>
+            </a:solidFill>
+            <a:headEnd type="none" w="med" len="med"/>
+            <a:tailEnd type="none" w="med" len="med"/>
+          </a:ln>
+        </p:spPr>
+        <p:style>
+          <a:lnRef idx="2">
+            <a:schemeClr val="accent1"/>
+          </a:lnRef>
+          <a:fillRef idx="1">
+            <a:schemeClr val="lt1"/>
+          </a:fillRef>
+          <a:effectRef idx="0">
+            <a:schemeClr val="accent1"/>
+          </a:effectRef>
+          <a:fontRef idx="minor">
+            <a:schemeClr val="dk1"/>
+          </a:fontRef>
+        </p:style>
+        <p:txBody>
+          <a:bodyPr vert="horz" wrap="none" lIns="90000" tIns="46800" rIns="90000" bIns="46800" numCol="1" rtlCol="0" anchor="ctr" anchorCtr="0" compatLnSpc="1">
+            <a:prstTxWarp prst="textNoShape">
+              <a:avLst/>
+            </a:prstTxWarp>
+          </a:bodyPr>
+          <a:lstStyle/>
+          <a:p>
+            <a:pPr marL="0" marR="0" indent="0" algn="ctr" defTabSz="914400" rtl="0" eaLnBrk="0" fontAlgn="base" latinLnBrk="0" hangingPunct="0">
+              <a:lnSpc>
+                <a:spcPct val="100000"/>
+              </a:lnSpc>
+              <a:spcBef>
+                <a:spcPct val="0"/>
+              </a:spcBef>
+              <a:spcAft>
+                <a:spcPct val="0"/>
+              </a:spcAft>
+              <a:buClrTx/>
+              <a:buSzTx/>
+              <a:buFontTx/>
+              <a:buNone/>
+              <a:tabLst/>
+            </a:pPr>
+            <a:r>
+              <a:rPr lang="en-US" altLang="ko-KR" b="1" dirty="0" smtClean="0">
+                <a:solidFill>
+                  <a:schemeClr val="bg1"/>
+                </a:solidFill>
+                <a:latin typeface="Goudy Old Style" panose="02020502050305020303" pitchFamily="18" charset="0"/>
+                <a:ea typeface="맑은 고딕" pitchFamily="50" charset="-127"/>
+              </a:rPr>
+              <a:t>To do </a:t>
+            </a:r>
+            <a:r>
+              <a:rPr lang="ko-KR" altLang="en-US" b="1" dirty="0" smtClean="0">
+                <a:solidFill>
+                  <a:schemeClr val="bg1"/>
+                </a:solidFill>
+                <a:latin typeface="Goudy Old Style" panose="02020502050305020303" pitchFamily="18" charset="0"/>
+                <a:ea typeface="맑은 고딕" pitchFamily="50" charset="-127"/>
+              </a:rPr>
+              <a:t>정렬</a:t>
+            </a:r>
+            <a:endParaRPr kumimoji="0" lang="ko-KR" altLang="en-US" sz="1400" b="1" i="0" u="none" strike="noStrike" cap="none" normalizeH="0" baseline="0" dirty="0" smtClean="0">
+              <a:solidFill>
+                <a:schemeClr val="bg1"/>
+              </a:solidFill>
+              <a:effectLst/>
+              <a:latin typeface="Goudy Old Style" panose="02020502050305020303" pitchFamily="18" charset="0"/>
+              <a:ea typeface="맑은 고딕" pitchFamily="50" charset="-127"/>
+            </a:endParaRPr>
+          </a:p>
+        </p:txBody>
+      </p:sp>
+      <p:sp>
+        <p:nvSpPr>
+          <p:cNvPr id="14" name="모서리가 둥근 직사각형 13"/>
+          <p:cNvSpPr/>
+          <p:nvPr/>
+        </p:nvSpPr>
+        <p:spPr bwMode="auto">
+          <a:xfrm>
+            <a:off x="2252971" y="5496573"/>
+            <a:ext cx="1099127" cy="665018"/>
+          </a:xfrm>
+          <a:prstGeom prst="roundRect">
+            <a:avLst/>
+          </a:prstGeom>
+          <a:solidFill>
+            <a:srgbClr val="0070C0"/>
+          </a:solidFill>
+          <a:ln w="38100">
+            <a:solidFill>
+              <a:srgbClr val="000099"/>
+            </a:solidFill>
+            <a:headEnd type="none" w="med" len="med"/>
+            <a:tailEnd type="none" w="med" len="med"/>
+          </a:ln>
+        </p:spPr>
+        <p:style>
+          <a:lnRef idx="2">
+            <a:schemeClr val="accent1"/>
+          </a:lnRef>
+          <a:fillRef idx="1">
+            <a:schemeClr val="lt1"/>
+          </a:fillRef>
+          <a:effectRef idx="0">
+            <a:schemeClr val="accent1"/>
+          </a:effectRef>
+          <a:fontRef idx="minor">
+            <a:schemeClr val="dk1"/>
+          </a:fontRef>
+        </p:style>
+        <p:txBody>
+          <a:bodyPr vert="horz" wrap="none" lIns="90000" tIns="46800" rIns="90000" bIns="46800" numCol="1" rtlCol="0" anchor="ctr" anchorCtr="0" compatLnSpc="1">
+            <a:prstTxWarp prst="textNoShape">
+              <a:avLst/>
+            </a:prstTxWarp>
+          </a:bodyPr>
+          <a:lstStyle/>
+          <a:p>
+            <a:pPr marL="0" marR="0" indent="0" algn="ctr" defTabSz="914400" rtl="0" eaLnBrk="0" fontAlgn="base" latinLnBrk="0" hangingPunct="0">
+              <a:lnSpc>
+                <a:spcPct val="100000"/>
+              </a:lnSpc>
+              <a:spcBef>
+                <a:spcPct val="0"/>
+              </a:spcBef>
+              <a:spcAft>
+                <a:spcPct val="0"/>
+              </a:spcAft>
+              <a:buClrTx/>
+              <a:buSzTx/>
+              <a:buFontTx/>
+              <a:buNone/>
+              <a:tabLst/>
+            </a:pPr>
+            <a:r>
+              <a:rPr lang="ko-KR" altLang="en-US" b="1" dirty="0" smtClean="0">
+                <a:solidFill>
+                  <a:schemeClr val="bg1"/>
+                </a:solidFill>
+                <a:latin typeface="Goudy Old Style" panose="02020502050305020303" pitchFamily="18" charset="0"/>
+                <a:ea typeface="맑은 고딕" pitchFamily="50" charset="-127"/>
+              </a:rPr>
+              <a:t>종료</a:t>
+            </a:r>
+            <a:endParaRPr kumimoji="0" lang="ko-KR" altLang="en-US" sz="1400" b="1" i="0" u="none" strike="noStrike" cap="none" normalizeH="0" baseline="0" dirty="0" smtClean="0">
+              <a:solidFill>
+                <a:schemeClr val="bg1"/>
+              </a:solidFill>
+              <a:effectLst/>
+              <a:latin typeface="Goudy Old Style" panose="02020502050305020303" pitchFamily="18" charset="0"/>
+              <a:ea typeface="맑은 고딕" pitchFamily="50" charset="-127"/>
+            </a:endParaRPr>
+          </a:p>
+        </p:txBody>
+      </p:sp>
+      <p:sp>
+        <p:nvSpPr>
+          <p:cNvPr id="15" name="모서리가 둥근 직사각형 14"/>
+          <p:cNvSpPr/>
+          <p:nvPr/>
+        </p:nvSpPr>
+        <p:spPr bwMode="auto">
+          <a:xfrm>
+            <a:off x="5909167" y="1963664"/>
+            <a:ext cx="1099127" cy="665018"/>
+          </a:xfrm>
+          <a:prstGeom prst="roundRect">
+            <a:avLst/>
+          </a:prstGeom>
+          <a:solidFill>
+            <a:srgbClr val="0070C0"/>
+          </a:solidFill>
+          <a:ln w="38100">
+            <a:solidFill>
+              <a:srgbClr val="000099"/>
+            </a:solidFill>
+            <a:headEnd type="none" w="med" len="med"/>
+            <a:tailEnd type="none" w="med" len="med"/>
+          </a:ln>
+        </p:spPr>
+        <p:style>
+          <a:lnRef idx="2">
+            <a:schemeClr val="accent1"/>
+          </a:lnRef>
+          <a:fillRef idx="1">
+            <a:schemeClr val="lt1"/>
+          </a:fillRef>
+          <a:effectRef idx="0">
+            <a:schemeClr val="accent1"/>
+          </a:effectRef>
+          <a:fontRef idx="minor">
+            <a:schemeClr val="dk1"/>
+          </a:fontRef>
+        </p:style>
+        <p:txBody>
+          <a:bodyPr vert="horz" wrap="none" lIns="90000" tIns="46800" rIns="90000" bIns="46800" numCol="1" rtlCol="0" anchor="ctr" anchorCtr="0" compatLnSpc="1">
+            <a:prstTxWarp prst="textNoShape">
+              <a:avLst/>
+            </a:prstTxWarp>
+          </a:bodyPr>
+          <a:lstStyle/>
+          <a:p>
+            <a:pPr marL="0" marR="0" indent="0" algn="ctr" defTabSz="914400" rtl="0" eaLnBrk="0" fontAlgn="base" latinLnBrk="0" hangingPunct="0">
+              <a:lnSpc>
+                <a:spcPct val="100000"/>
+              </a:lnSpc>
+              <a:spcBef>
+                <a:spcPct val="0"/>
+              </a:spcBef>
+              <a:spcAft>
+                <a:spcPct val="0"/>
+              </a:spcAft>
+              <a:buClrTx/>
+              <a:buSzTx/>
+              <a:buFontTx/>
+              <a:buNone/>
+              <a:tabLst/>
+            </a:pPr>
+            <a:r>
+              <a:rPr lang="ko-KR" altLang="en-US" b="1" dirty="0" smtClean="0">
+                <a:solidFill>
+                  <a:schemeClr val="bg1"/>
+                </a:solidFill>
+                <a:latin typeface="Goudy Old Style" panose="02020502050305020303" pitchFamily="18" charset="0"/>
+                <a:ea typeface="맑은 고딕" pitchFamily="50" charset="-127"/>
+              </a:rPr>
+              <a:t>과목 변경</a:t>
+            </a:r>
+            <a:endParaRPr kumimoji="0" lang="ko-KR" altLang="en-US" sz="1400" b="1" i="0" u="none" strike="noStrike" cap="none" normalizeH="0" baseline="0" dirty="0" smtClean="0">
+              <a:solidFill>
+                <a:schemeClr val="bg1"/>
+              </a:solidFill>
+              <a:effectLst/>
+              <a:latin typeface="Goudy Old Style" panose="02020502050305020303" pitchFamily="18" charset="0"/>
+              <a:ea typeface="맑은 고딕" pitchFamily="50" charset="-127"/>
+            </a:endParaRPr>
+          </a:p>
+        </p:txBody>
+      </p:sp>
+      <p:sp>
+        <p:nvSpPr>
+          <p:cNvPr id="16" name="모서리가 둥근 직사각형 15"/>
+          <p:cNvSpPr/>
+          <p:nvPr/>
+        </p:nvSpPr>
+        <p:spPr bwMode="auto">
+          <a:xfrm>
+            <a:off x="7737260" y="3362973"/>
+            <a:ext cx="1099127" cy="665018"/>
+          </a:xfrm>
+          <a:prstGeom prst="roundRect">
+            <a:avLst/>
+          </a:prstGeom>
+          <a:solidFill>
+            <a:srgbClr val="0070C0"/>
+          </a:solidFill>
+          <a:ln w="38100">
+            <a:solidFill>
+              <a:srgbClr val="000099"/>
+            </a:solidFill>
+            <a:headEnd type="none" w="med" len="med"/>
+            <a:tailEnd type="none" w="med" len="med"/>
+          </a:ln>
+        </p:spPr>
+        <p:style>
+          <a:lnRef idx="2">
+            <a:schemeClr val="accent1"/>
+          </a:lnRef>
+          <a:fillRef idx="1">
+            <a:schemeClr val="lt1"/>
+          </a:fillRef>
+          <a:effectRef idx="0">
+            <a:schemeClr val="accent1"/>
+          </a:effectRef>
+          <a:fontRef idx="minor">
+            <a:schemeClr val="dk1"/>
+          </a:fontRef>
+        </p:style>
+        <p:txBody>
+          <a:bodyPr vert="horz" wrap="none" lIns="90000" tIns="46800" rIns="90000" bIns="46800" numCol="1" rtlCol="0" anchor="ctr" anchorCtr="0" compatLnSpc="1">
+            <a:prstTxWarp prst="textNoShape">
+              <a:avLst/>
+            </a:prstTxWarp>
+          </a:bodyPr>
+          <a:lstStyle/>
+          <a:p>
+            <a:pPr marL="0" marR="0" indent="0" algn="ctr" defTabSz="914400" rtl="0" eaLnBrk="0" fontAlgn="base" latinLnBrk="0" hangingPunct="0">
+              <a:lnSpc>
+                <a:spcPct val="100000"/>
+              </a:lnSpc>
+              <a:spcBef>
+                <a:spcPct val="0"/>
+              </a:spcBef>
+              <a:spcAft>
+                <a:spcPct val="0"/>
+              </a:spcAft>
+              <a:buClrTx/>
+              <a:buSzTx/>
+              <a:buFontTx/>
+              <a:buNone/>
+              <a:tabLst/>
+            </a:pPr>
+            <a:r>
+              <a:rPr lang="en-US" altLang="ko-KR" b="1" dirty="0" smtClean="0">
+                <a:solidFill>
+                  <a:schemeClr val="bg1"/>
+                </a:solidFill>
+                <a:latin typeface="Goudy Old Style" panose="02020502050305020303" pitchFamily="18" charset="0"/>
+                <a:ea typeface="맑은 고딕" pitchFamily="50" charset="-127"/>
+              </a:rPr>
+              <a:t>To do </a:t>
+            </a:r>
+            <a:r>
+              <a:rPr lang="ko-KR" altLang="en-US" b="1" dirty="0" smtClean="0">
+                <a:solidFill>
+                  <a:schemeClr val="bg1"/>
+                </a:solidFill>
+                <a:latin typeface="Goudy Old Style" panose="02020502050305020303" pitchFamily="18" charset="0"/>
+                <a:ea typeface="맑은 고딕" pitchFamily="50" charset="-127"/>
+              </a:rPr>
+              <a:t>삭제</a:t>
+            </a:r>
+            <a:endParaRPr kumimoji="0" lang="ko-KR" altLang="en-US" sz="1400" b="1" i="0" u="none" strike="noStrike" cap="none" normalizeH="0" baseline="0" dirty="0" smtClean="0">
+              <a:solidFill>
+                <a:schemeClr val="bg1"/>
+              </a:solidFill>
+              <a:effectLst/>
+              <a:latin typeface="Goudy Old Style" panose="02020502050305020303" pitchFamily="18" charset="0"/>
+              <a:ea typeface="맑은 고딕" pitchFamily="50" charset="-127"/>
+            </a:endParaRPr>
+          </a:p>
+        </p:txBody>
+      </p:sp>
+      <p:sp>
+        <p:nvSpPr>
+          <p:cNvPr id="17" name="모서리가 둥근 직사각형 16"/>
+          <p:cNvSpPr/>
+          <p:nvPr/>
+        </p:nvSpPr>
+        <p:spPr bwMode="auto">
+          <a:xfrm>
+            <a:off x="4081068" y="3362973"/>
+            <a:ext cx="1099127" cy="665018"/>
+          </a:xfrm>
+          <a:prstGeom prst="roundRect">
+            <a:avLst>
+              <a:gd name="adj" fmla="val 11446"/>
+            </a:avLst>
+          </a:prstGeom>
+          <a:solidFill>
+            <a:srgbClr val="0070C0"/>
+          </a:solidFill>
+          <a:ln w="38100">
+            <a:solidFill>
+              <a:srgbClr val="000099"/>
+            </a:solidFill>
+            <a:headEnd type="none" w="med" len="med"/>
+            <a:tailEnd type="none" w="med" len="med"/>
+          </a:ln>
+        </p:spPr>
+        <p:style>
+          <a:lnRef idx="2">
+            <a:schemeClr val="accent1"/>
+          </a:lnRef>
+          <a:fillRef idx="1">
+            <a:schemeClr val="lt1"/>
+          </a:fillRef>
+          <a:effectRef idx="0">
+            <a:schemeClr val="accent1"/>
+          </a:effectRef>
+          <a:fontRef idx="minor">
+            <a:schemeClr val="dk1"/>
+          </a:fontRef>
+        </p:style>
+        <p:txBody>
+          <a:bodyPr vert="horz" wrap="none" lIns="90000" tIns="46800" rIns="90000" bIns="46800" numCol="1" rtlCol="0" anchor="ctr" anchorCtr="0" compatLnSpc="1">
+            <a:prstTxWarp prst="textNoShape">
+              <a:avLst/>
+            </a:prstTxWarp>
+          </a:bodyPr>
+          <a:lstStyle/>
+          <a:p>
+            <a:pPr marL="0" marR="0" indent="0" algn="ctr" defTabSz="914400" rtl="0" eaLnBrk="0" fontAlgn="base" latinLnBrk="0" hangingPunct="0">
+              <a:lnSpc>
+                <a:spcPct val="100000"/>
+              </a:lnSpc>
+              <a:spcBef>
+                <a:spcPct val="0"/>
+              </a:spcBef>
+              <a:spcAft>
+                <a:spcPct val="0"/>
+              </a:spcAft>
+              <a:buClrTx/>
+              <a:buSzTx/>
+              <a:buFontTx/>
+              <a:buNone/>
+              <a:tabLst/>
+            </a:pPr>
+            <a:r>
+              <a:rPr lang="en-US" altLang="ko-KR" b="1" dirty="0" smtClean="0">
+                <a:solidFill>
+                  <a:schemeClr val="bg1"/>
+                </a:solidFill>
+                <a:latin typeface="Goudy Old Style" panose="02020502050305020303" pitchFamily="18" charset="0"/>
+                <a:ea typeface="맑은 고딕" pitchFamily="50" charset="-127"/>
+              </a:rPr>
+              <a:t>To do </a:t>
+            </a:r>
+            <a:r>
+              <a:rPr lang="ko-KR" altLang="en-US" b="1" dirty="0" smtClean="0">
+                <a:solidFill>
+                  <a:schemeClr val="bg1"/>
+                </a:solidFill>
+                <a:latin typeface="Goudy Old Style" panose="02020502050305020303" pitchFamily="18" charset="0"/>
+                <a:ea typeface="맑은 고딕" pitchFamily="50" charset="-127"/>
+              </a:rPr>
+              <a:t>추가</a:t>
+            </a:r>
+            <a:endParaRPr kumimoji="0" lang="ko-KR" altLang="en-US" sz="1400" b="1" i="0" u="none" strike="noStrike" cap="none" normalizeH="0" baseline="0" dirty="0" smtClean="0">
+              <a:solidFill>
+                <a:schemeClr val="bg1"/>
+              </a:solidFill>
+              <a:effectLst/>
+              <a:latin typeface="Goudy Old Style" panose="02020502050305020303" pitchFamily="18" charset="0"/>
+              <a:ea typeface="맑은 고딕" pitchFamily="50" charset="-127"/>
+            </a:endParaRPr>
+          </a:p>
+        </p:txBody>
+      </p:sp>
+      <p:sp>
+        <p:nvSpPr>
+          <p:cNvPr id="20" name="모서리가 둥근 직사각형 19"/>
+          <p:cNvSpPr/>
+          <p:nvPr/>
+        </p:nvSpPr>
+        <p:spPr bwMode="auto">
+          <a:xfrm>
+            <a:off x="7737259" y="4831555"/>
+            <a:ext cx="1099127" cy="665018"/>
+          </a:xfrm>
+          <a:prstGeom prst="roundRect">
+            <a:avLst/>
+          </a:prstGeom>
+          <a:solidFill>
+            <a:srgbClr val="0070C0"/>
+          </a:solidFill>
+          <a:ln w="38100">
+            <a:solidFill>
+              <a:srgbClr val="000099"/>
+            </a:solidFill>
+            <a:headEnd type="none" w="med" len="med"/>
+            <a:tailEnd type="none" w="med" len="med"/>
+          </a:ln>
+        </p:spPr>
+        <p:style>
+          <a:lnRef idx="2">
+            <a:schemeClr val="accent1"/>
+          </a:lnRef>
+          <a:fillRef idx="1">
+            <a:schemeClr val="lt1"/>
+          </a:fillRef>
+          <a:effectRef idx="0">
+            <a:schemeClr val="accent1"/>
+          </a:effectRef>
+          <a:fontRef idx="minor">
+            <a:schemeClr val="dk1"/>
+          </a:fontRef>
+        </p:style>
+        <p:txBody>
+          <a:bodyPr vert="horz" wrap="none" lIns="90000" tIns="46800" rIns="90000" bIns="46800" numCol="1" rtlCol="0" anchor="ctr" anchorCtr="0" compatLnSpc="1">
+            <a:prstTxWarp prst="textNoShape">
+              <a:avLst/>
+            </a:prstTxWarp>
+          </a:bodyPr>
+          <a:lstStyle/>
+          <a:p>
+            <a:pPr marL="0" marR="0" indent="0" algn="ctr" defTabSz="914400" rtl="0" eaLnBrk="0" fontAlgn="base" latinLnBrk="0" hangingPunct="0">
+              <a:lnSpc>
+                <a:spcPct val="100000"/>
+              </a:lnSpc>
+              <a:spcBef>
+                <a:spcPct val="0"/>
+              </a:spcBef>
+              <a:spcAft>
+                <a:spcPct val="0"/>
+              </a:spcAft>
+              <a:buClrTx/>
+              <a:buSzTx/>
+              <a:buFontTx/>
+              <a:buNone/>
+              <a:tabLst/>
+            </a:pPr>
+            <a:r>
+              <a:rPr lang="ko-KR" altLang="en-US" b="1" dirty="0" smtClean="0">
+                <a:solidFill>
+                  <a:schemeClr val="bg1"/>
+                </a:solidFill>
+                <a:latin typeface="Goudy Old Style" panose="02020502050305020303" pitchFamily="18" charset="0"/>
+                <a:ea typeface="맑은 고딕" pitchFamily="50" charset="-127"/>
+              </a:rPr>
+              <a:t>중요도 별</a:t>
+            </a:r>
+            <a:endParaRPr kumimoji="0" lang="ko-KR" altLang="en-US" sz="1400" b="1" i="0" u="none" strike="noStrike" cap="none" normalizeH="0" baseline="0" dirty="0" smtClean="0">
+              <a:solidFill>
+                <a:schemeClr val="bg1"/>
+              </a:solidFill>
+              <a:effectLst/>
+              <a:latin typeface="Goudy Old Style" panose="02020502050305020303" pitchFamily="18" charset="0"/>
+              <a:ea typeface="맑은 고딕" pitchFamily="50" charset="-127"/>
+            </a:endParaRPr>
+          </a:p>
+        </p:txBody>
+      </p:sp>
+      <p:sp>
+        <p:nvSpPr>
+          <p:cNvPr id="21" name="모서리가 둥근 직사각형 20"/>
+          <p:cNvSpPr/>
+          <p:nvPr/>
+        </p:nvSpPr>
+        <p:spPr bwMode="auto">
+          <a:xfrm>
+            <a:off x="5909165" y="4848918"/>
+            <a:ext cx="1099127" cy="665018"/>
+          </a:xfrm>
+          <a:prstGeom prst="roundRect">
+            <a:avLst/>
+          </a:prstGeom>
+          <a:solidFill>
+            <a:srgbClr val="0070C0"/>
+          </a:solidFill>
+          <a:ln w="38100">
+            <a:solidFill>
+              <a:srgbClr val="000099"/>
+            </a:solidFill>
+            <a:headEnd type="none" w="med" len="med"/>
+            <a:tailEnd type="none" w="med" len="med"/>
+          </a:ln>
+        </p:spPr>
+        <p:style>
+          <a:lnRef idx="2">
+            <a:schemeClr val="accent1"/>
+          </a:lnRef>
+          <a:fillRef idx="1">
+            <a:schemeClr val="lt1"/>
+          </a:fillRef>
+          <a:effectRef idx="0">
+            <a:schemeClr val="accent1"/>
+          </a:effectRef>
+          <a:fontRef idx="minor">
+            <a:schemeClr val="dk1"/>
+          </a:fontRef>
+        </p:style>
+        <p:txBody>
+          <a:bodyPr vert="horz" wrap="none" lIns="90000" tIns="46800" rIns="90000" bIns="46800" numCol="1" rtlCol="0" anchor="ctr" anchorCtr="0" compatLnSpc="1">
+            <a:prstTxWarp prst="textNoShape">
+              <a:avLst/>
+            </a:prstTxWarp>
+          </a:bodyPr>
+          <a:lstStyle/>
+          <a:p>
+            <a:pPr marL="0" marR="0" indent="0" algn="ctr" defTabSz="914400" rtl="0" eaLnBrk="0" fontAlgn="base" latinLnBrk="0" hangingPunct="0">
+              <a:lnSpc>
+                <a:spcPct val="100000"/>
+              </a:lnSpc>
+              <a:spcBef>
+                <a:spcPct val="0"/>
+              </a:spcBef>
+              <a:spcAft>
+                <a:spcPct val="0"/>
+              </a:spcAft>
+              <a:buClrTx/>
+              <a:buSzTx/>
+              <a:buFontTx/>
+              <a:buNone/>
+              <a:tabLst/>
+            </a:pPr>
+            <a:r>
+              <a:rPr lang="ko-KR" altLang="en-US" b="1" dirty="0" smtClean="0">
+                <a:solidFill>
+                  <a:schemeClr val="bg1"/>
+                </a:solidFill>
+                <a:latin typeface="Goudy Old Style" panose="02020502050305020303" pitchFamily="18" charset="0"/>
+                <a:ea typeface="맑은 고딕" pitchFamily="50" charset="-127"/>
+              </a:rPr>
+              <a:t>날짜 별</a:t>
+            </a:r>
+            <a:endParaRPr kumimoji="0" lang="ko-KR" altLang="en-US" sz="1400" b="1" i="0" u="none" strike="noStrike" cap="none" normalizeH="0" baseline="0" dirty="0" smtClean="0">
+              <a:solidFill>
+                <a:schemeClr val="bg1"/>
+              </a:solidFill>
+              <a:effectLst/>
+              <a:latin typeface="Goudy Old Style" panose="02020502050305020303" pitchFamily="18" charset="0"/>
+              <a:ea typeface="맑은 고딕" pitchFamily="50" charset="-127"/>
+            </a:endParaRPr>
+          </a:p>
+        </p:txBody>
+      </p:sp>
+      <p:sp>
+        <p:nvSpPr>
+          <p:cNvPr id="22" name="모서리가 둥근 직사각형 21"/>
+          <p:cNvSpPr/>
+          <p:nvPr/>
+        </p:nvSpPr>
+        <p:spPr bwMode="auto">
+          <a:xfrm>
+            <a:off x="4081068" y="4848918"/>
+            <a:ext cx="1099127" cy="665018"/>
+          </a:xfrm>
+          <a:prstGeom prst="roundRect">
+            <a:avLst/>
+          </a:prstGeom>
+          <a:solidFill>
+            <a:srgbClr val="0070C0"/>
+          </a:solidFill>
+          <a:ln w="38100">
+            <a:solidFill>
+              <a:srgbClr val="000099"/>
+            </a:solidFill>
+            <a:headEnd type="none" w="med" len="med"/>
+            <a:tailEnd type="none" w="med" len="med"/>
+          </a:ln>
+        </p:spPr>
+        <p:style>
+          <a:lnRef idx="2">
+            <a:schemeClr val="accent1"/>
+          </a:lnRef>
+          <a:fillRef idx="1">
+            <a:schemeClr val="lt1"/>
+          </a:fillRef>
+          <a:effectRef idx="0">
+            <a:schemeClr val="accent1"/>
+          </a:effectRef>
+          <a:fontRef idx="minor">
+            <a:schemeClr val="dk1"/>
+          </a:fontRef>
+        </p:style>
+        <p:txBody>
+          <a:bodyPr vert="horz" wrap="none" lIns="90000" tIns="46800" rIns="90000" bIns="46800" numCol="1" rtlCol="0" anchor="ctr" anchorCtr="0" compatLnSpc="1">
+            <a:prstTxWarp prst="textNoShape">
+              <a:avLst/>
+            </a:prstTxWarp>
+          </a:bodyPr>
+          <a:lstStyle/>
+          <a:p>
+            <a:pPr marL="0" marR="0" indent="0" algn="ctr" defTabSz="914400" rtl="0" eaLnBrk="0" fontAlgn="base" latinLnBrk="0" hangingPunct="0">
+              <a:lnSpc>
+                <a:spcPct val="100000"/>
+              </a:lnSpc>
+              <a:spcBef>
+                <a:spcPct val="0"/>
+              </a:spcBef>
+              <a:spcAft>
+                <a:spcPct val="0"/>
+              </a:spcAft>
+              <a:buClrTx/>
+              <a:buSzTx/>
+              <a:buFontTx/>
+              <a:buNone/>
+              <a:tabLst/>
+            </a:pPr>
+            <a:r>
+              <a:rPr lang="ko-KR" altLang="en-US" b="1" dirty="0" smtClean="0">
+                <a:solidFill>
+                  <a:schemeClr val="bg1"/>
+                </a:solidFill>
+                <a:latin typeface="Goudy Old Style" panose="02020502050305020303" pitchFamily="18" charset="0"/>
+                <a:ea typeface="맑은 고딕" pitchFamily="50" charset="-127"/>
+              </a:rPr>
+              <a:t>과목 별</a:t>
+            </a:r>
+            <a:endParaRPr kumimoji="0" lang="ko-KR" altLang="en-US" sz="1400" b="1" i="0" u="none" strike="noStrike" cap="none" normalizeH="0" baseline="0" dirty="0" smtClean="0">
+              <a:solidFill>
+                <a:schemeClr val="bg1"/>
+              </a:solidFill>
+              <a:effectLst/>
+              <a:latin typeface="Goudy Old Style" panose="02020502050305020303" pitchFamily="18" charset="0"/>
+              <a:ea typeface="맑은 고딕" pitchFamily="50" charset="-127"/>
+            </a:endParaRPr>
+          </a:p>
+        </p:txBody>
+      </p:sp>
+      <p:cxnSp>
+        <p:nvCxnSpPr>
+          <p:cNvPr id="23" name="직선 연결선 22"/>
+          <p:cNvCxnSpPr>
+            <a:stCxn id="5" idx="3"/>
+            <a:endCxn id="12" idx="1"/>
+          </p:cNvCxnSpPr>
+          <p:nvPr/>
+        </p:nvCxnSpPr>
+        <p:spPr bwMode="auto">
+          <a:xfrm>
+            <a:off x="1524000" y="1631155"/>
+            <a:ext cx="728971" cy="0"/>
+          </a:xfrm>
+          <a:prstGeom prst="line">
+            <a:avLst/>
+          </a:prstGeom>
+          <a:solidFill>
+            <a:schemeClr val="accent1"/>
+          </a:solidFill>
+          <a:ln w="38100" cap="flat" cmpd="sng" algn="ctr">
+            <a:solidFill>
+              <a:schemeClr val="tx1"/>
+            </a:solidFill>
+            <a:prstDash val="solid"/>
+            <a:round/>
+            <a:headEnd type="none" w="med" len="med"/>
+            <a:tailEnd type="none" w="med" len="med"/>
+          </a:ln>
+          <a:effectLst/>
+        </p:spPr>
+      </p:cxnSp>
+      <p:cxnSp>
+        <p:nvCxnSpPr>
+          <p:cNvPr id="25" name="직선 연결선 24"/>
+          <p:cNvCxnSpPr>
+            <a:stCxn id="12" idx="3"/>
+          </p:cNvCxnSpPr>
+          <p:nvPr/>
+        </p:nvCxnSpPr>
+        <p:spPr bwMode="auto">
+          <a:xfrm>
+            <a:off x="3352098" y="1631155"/>
+            <a:ext cx="4934727" cy="0"/>
+          </a:xfrm>
+          <a:prstGeom prst="line">
+            <a:avLst/>
+          </a:prstGeom>
+          <a:solidFill>
+            <a:schemeClr val="accent1"/>
+          </a:solidFill>
+          <a:ln w="38100" cap="flat" cmpd="sng" algn="ctr">
+            <a:solidFill>
+              <a:schemeClr val="tx1"/>
+            </a:solidFill>
+            <a:prstDash val="solid"/>
+            <a:round/>
+            <a:headEnd type="none" w="med" len="med"/>
+            <a:tailEnd type="none" w="med" len="med"/>
+          </a:ln>
+          <a:effectLst/>
+        </p:spPr>
+      </p:cxnSp>
+      <p:cxnSp>
+        <p:nvCxnSpPr>
+          <p:cNvPr id="30" name="직선 연결선 29"/>
+          <p:cNvCxnSpPr>
+            <a:stCxn id="9" idx="0"/>
+          </p:cNvCxnSpPr>
+          <p:nvPr/>
+        </p:nvCxnSpPr>
+        <p:spPr bwMode="auto">
+          <a:xfrm flipH="1" flipV="1">
+            <a:off x="8286822" y="1631155"/>
+            <a:ext cx="3" cy="332509"/>
+          </a:xfrm>
+          <a:prstGeom prst="line">
+            <a:avLst/>
+          </a:prstGeom>
+          <a:solidFill>
+            <a:schemeClr val="accent1"/>
+          </a:solidFill>
+          <a:ln w="38100" cap="flat" cmpd="sng" algn="ctr">
+            <a:solidFill>
+              <a:schemeClr val="tx1"/>
+            </a:solidFill>
+            <a:prstDash val="solid"/>
+            <a:round/>
+            <a:headEnd type="none" w="med" len="med"/>
+            <a:tailEnd type="none" w="med" len="med"/>
+          </a:ln>
+          <a:effectLst/>
+        </p:spPr>
+      </p:cxnSp>
+      <p:cxnSp>
+        <p:nvCxnSpPr>
+          <p:cNvPr id="1024" name="직선 연결선 1023"/>
+          <p:cNvCxnSpPr>
+            <a:stCxn id="15" idx="0"/>
+          </p:cNvCxnSpPr>
+          <p:nvPr/>
+        </p:nvCxnSpPr>
+        <p:spPr bwMode="auto">
+          <a:xfrm flipH="1" flipV="1">
+            <a:off x="6458728" y="1631155"/>
+            <a:ext cx="3" cy="332509"/>
+          </a:xfrm>
+          <a:prstGeom prst="line">
+            <a:avLst/>
+          </a:prstGeom>
+          <a:solidFill>
+            <a:schemeClr val="accent1"/>
+          </a:solidFill>
+          <a:ln w="38100" cap="flat" cmpd="sng" algn="ctr">
+            <a:solidFill>
+              <a:schemeClr val="tx1"/>
+            </a:solidFill>
+            <a:prstDash val="solid"/>
+            <a:round/>
+            <a:headEnd type="none" w="med" len="med"/>
+            <a:tailEnd type="none" w="med" len="med"/>
+          </a:ln>
+          <a:effectLst/>
+        </p:spPr>
+      </p:cxnSp>
+      <p:cxnSp>
+        <p:nvCxnSpPr>
+          <p:cNvPr id="1027" name="직선 연결선 1026"/>
+          <p:cNvCxnSpPr>
+            <a:stCxn id="8" idx="0"/>
+          </p:cNvCxnSpPr>
+          <p:nvPr/>
+        </p:nvCxnSpPr>
+        <p:spPr bwMode="auto">
+          <a:xfrm flipH="1" flipV="1">
+            <a:off x="4630626" y="1640302"/>
+            <a:ext cx="5" cy="323362"/>
+          </a:xfrm>
+          <a:prstGeom prst="line">
+            <a:avLst/>
+          </a:prstGeom>
+          <a:solidFill>
+            <a:schemeClr val="accent1"/>
+          </a:solidFill>
+          <a:ln w="38100" cap="flat" cmpd="sng" algn="ctr">
+            <a:solidFill>
+              <a:schemeClr val="tx1"/>
+            </a:solidFill>
+            <a:prstDash val="solid"/>
+            <a:round/>
+            <a:headEnd type="none" w="med" len="med"/>
+            <a:tailEnd type="none" w="med" len="med"/>
+          </a:ln>
+          <a:effectLst/>
+        </p:spPr>
+      </p:cxnSp>
+      <p:cxnSp>
+        <p:nvCxnSpPr>
+          <p:cNvPr id="1035" name="직선 연결선 1034"/>
+          <p:cNvCxnSpPr/>
+          <p:nvPr/>
+        </p:nvCxnSpPr>
+        <p:spPr bwMode="auto">
+          <a:xfrm>
+            <a:off x="1888485" y="1640302"/>
+            <a:ext cx="0" cy="4188780"/>
+          </a:xfrm>
+          <a:prstGeom prst="line">
+            <a:avLst/>
+          </a:prstGeom>
+          <a:solidFill>
+            <a:schemeClr val="accent1"/>
+          </a:solidFill>
+          <a:ln w="38100" cap="flat" cmpd="sng" algn="ctr">
+            <a:solidFill>
+              <a:schemeClr val="tx1"/>
+            </a:solidFill>
+            <a:prstDash val="solid"/>
+            <a:round/>
+            <a:headEnd type="none" w="med" len="med"/>
+            <a:tailEnd type="none" w="med" len="med"/>
+          </a:ln>
+          <a:effectLst/>
+        </p:spPr>
+      </p:cxnSp>
+      <p:cxnSp>
+        <p:nvCxnSpPr>
+          <p:cNvPr id="1037" name="직선 연결선 1036"/>
+          <p:cNvCxnSpPr>
+            <a:stCxn id="14" idx="1"/>
+          </p:cNvCxnSpPr>
+          <p:nvPr/>
+        </p:nvCxnSpPr>
+        <p:spPr bwMode="auto">
+          <a:xfrm flipH="1">
+            <a:off x="1888485" y="5829082"/>
+            <a:ext cx="364486" cy="0"/>
+          </a:xfrm>
+          <a:prstGeom prst="line">
+            <a:avLst/>
+          </a:prstGeom>
+          <a:solidFill>
+            <a:schemeClr val="accent1"/>
+          </a:solidFill>
+          <a:ln w="38100" cap="flat" cmpd="sng" algn="ctr">
+            <a:solidFill>
+              <a:schemeClr val="tx1"/>
+            </a:solidFill>
+            <a:prstDash val="solid"/>
+            <a:round/>
+            <a:headEnd type="none" w="med" len="med"/>
+            <a:tailEnd type="none" w="med" len="med"/>
+          </a:ln>
+          <a:effectLst/>
+        </p:spPr>
+      </p:cxnSp>
+      <p:cxnSp>
+        <p:nvCxnSpPr>
+          <p:cNvPr id="1039" name="직선 연결선 1038"/>
+          <p:cNvCxnSpPr>
+            <a:stCxn id="13" idx="1"/>
+          </p:cNvCxnSpPr>
+          <p:nvPr/>
+        </p:nvCxnSpPr>
+        <p:spPr bwMode="auto">
+          <a:xfrm flipH="1">
+            <a:off x="1888485" y="4429773"/>
+            <a:ext cx="364484" cy="3331"/>
+          </a:xfrm>
+          <a:prstGeom prst="line">
+            <a:avLst/>
+          </a:prstGeom>
+          <a:solidFill>
+            <a:schemeClr val="accent1"/>
+          </a:solidFill>
+          <a:ln w="38100" cap="flat" cmpd="sng" algn="ctr">
+            <a:solidFill>
+              <a:schemeClr val="tx1"/>
+            </a:solidFill>
+            <a:prstDash val="solid"/>
+            <a:round/>
+            <a:headEnd type="none" w="med" len="med"/>
+            <a:tailEnd type="none" w="med" len="med"/>
+          </a:ln>
+          <a:effectLst/>
+        </p:spPr>
+      </p:cxnSp>
+      <p:cxnSp>
+        <p:nvCxnSpPr>
+          <p:cNvPr id="1041" name="직선 연결선 1040"/>
+          <p:cNvCxnSpPr>
+            <a:stCxn id="11" idx="1"/>
+          </p:cNvCxnSpPr>
+          <p:nvPr/>
+        </p:nvCxnSpPr>
+        <p:spPr bwMode="auto">
+          <a:xfrm flipH="1">
+            <a:off x="1888485" y="3030464"/>
+            <a:ext cx="364485" cy="2103"/>
+          </a:xfrm>
+          <a:prstGeom prst="line">
+            <a:avLst/>
+          </a:prstGeom>
+          <a:solidFill>
+            <a:schemeClr val="accent1"/>
+          </a:solidFill>
+          <a:ln w="38100" cap="flat" cmpd="sng" algn="ctr">
+            <a:solidFill>
+              <a:schemeClr val="tx1"/>
+            </a:solidFill>
+            <a:prstDash val="solid"/>
+            <a:round/>
+            <a:headEnd type="none" w="med" len="med"/>
+            <a:tailEnd type="none" w="med" len="med"/>
+          </a:ln>
+          <a:effectLst/>
+        </p:spPr>
+      </p:cxnSp>
+      <p:cxnSp>
+        <p:nvCxnSpPr>
+          <p:cNvPr id="1045" name="직선 연결선 1044"/>
+          <p:cNvCxnSpPr>
+            <a:stCxn id="11" idx="3"/>
+          </p:cNvCxnSpPr>
+          <p:nvPr/>
+        </p:nvCxnSpPr>
+        <p:spPr bwMode="auto">
+          <a:xfrm>
+            <a:off x="3352097" y="3030464"/>
+            <a:ext cx="4934728" cy="2103"/>
+          </a:xfrm>
+          <a:prstGeom prst="line">
+            <a:avLst/>
+          </a:prstGeom>
+          <a:solidFill>
+            <a:schemeClr val="accent1"/>
+          </a:solidFill>
+          <a:ln w="38100" cap="flat" cmpd="sng" algn="ctr">
+            <a:solidFill>
+              <a:schemeClr val="tx1"/>
+            </a:solidFill>
+            <a:prstDash val="solid"/>
+            <a:round/>
+            <a:headEnd type="none" w="med" len="med"/>
+            <a:tailEnd type="none" w="med" len="med"/>
+          </a:ln>
+          <a:effectLst/>
+        </p:spPr>
+      </p:cxnSp>
+      <p:cxnSp>
+        <p:nvCxnSpPr>
+          <p:cNvPr id="1047" name="직선 연결선 1046"/>
+          <p:cNvCxnSpPr>
+            <a:stCxn id="16" idx="0"/>
+          </p:cNvCxnSpPr>
+          <p:nvPr/>
+        </p:nvCxnSpPr>
+        <p:spPr bwMode="auto">
+          <a:xfrm flipV="1">
+            <a:off x="8286824" y="3032567"/>
+            <a:ext cx="1" cy="330406"/>
+          </a:xfrm>
+          <a:prstGeom prst="line">
+            <a:avLst/>
+          </a:prstGeom>
+          <a:solidFill>
+            <a:schemeClr val="accent1"/>
+          </a:solidFill>
+          <a:ln w="38100" cap="flat" cmpd="sng" algn="ctr">
+            <a:solidFill>
+              <a:schemeClr val="tx1"/>
+            </a:solidFill>
+            <a:prstDash val="solid"/>
+            <a:round/>
+            <a:headEnd type="none" w="med" len="med"/>
+            <a:tailEnd type="none" w="med" len="med"/>
+          </a:ln>
+          <a:effectLst/>
+        </p:spPr>
+      </p:cxnSp>
+      <p:cxnSp>
+        <p:nvCxnSpPr>
+          <p:cNvPr id="1049" name="직선 연결선 1048"/>
+          <p:cNvCxnSpPr>
+            <a:stCxn id="10" idx="0"/>
+          </p:cNvCxnSpPr>
+          <p:nvPr/>
+        </p:nvCxnSpPr>
+        <p:spPr bwMode="auto">
+          <a:xfrm flipH="1" flipV="1">
+            <a:off x="6458728" y="3032567"/>
+            <a:ext cx="3" cy="330406"/>
+          </a:xfrm>
+          <a:prstGeom prst="line">
+            <a:avLst/>
+          </a:prstGeom>
+          <a:solidFill>
+            <a:schemeClr val="accent1"/>
+          </a:solidFill>
+          <a:ln w="38100" cap="flat" cmpd="sng" algn="ctr">
+            <a:solidFill>
+              <a:schemeClr val="tx1"/>
+            </a:solidFill>
+            <a:prstDash val="solid"/>
+            <a:round/>
+            <a:headEnd type="none" w="med" len="med"/>
+            <a:tailEnd type="none" w="med" len="med"/>
+          </a:ln>
+          <a:effectLst/>
+        </p:spPr>
+      </p:cxnSp>
+      <p:cxnSp>
+        <p:nvCxnSpPr>
+          <p:cNvPr id="1051" name="직선 연결선 1050"/>
+          <p:cNvCxnSpPr>
+            <a:stCxn id="17" idx="0"/>
+          </p:cNvCxnSpPr>
+          <p:nvPr/>
+        </p:nvCxnSpPr>
+        <p:spPr bwMode="auto">
+          <a:xfrm flipH="1" flipV="1">
+            <a:off x="4630626" y="3032567"/>
+            <a:ext cx="6" cy="330406"/>
+          </a:xfrm>
+          <a:prstGeom prst="line">
+            <a:avLst/>
+          </a:prstGeom>
+          <a:solidFill>
+            <a:schemeClr val="accent1"/>
+          </a:solidFill>
+          <a:ln w="38100" cap="flat" cmpd="sng" algn="ctr">
+            <a:solidFill>
+              <a:schemeClr val="tx1"/>
+            </a:solidFill>
+            <a:prstDash val="solid"/>
+            <a:round/>
+            <a:headEnd type="none" w="med" len="med"/>
+            <a:tailEnd type="none" w="med" len="med"/>
+          </a:ln>
+          <a:effectLst/>
+        </p:spPr>
+      </p:cxnSp>
+      <p:cxnSp>
+        <p:nvCxnSpPr>
+          <p:cNvPr id="1056" name="직선 연결선 1055"/>
+          <p:cNvCxnSpPr>
+            <a:stCxn id="13" idx="3"/>
+          </p:cNvCxnSpPr>
+          <p:nvPr/>
+        </p:nvCxnSpPr>
+        <p:spPr bwMode="auto">
+          <a:xfrm>
+            <a:off x="3352096" y="4429773"/>
+            <a:ext cx="450760" cy="3331"/>
+          </a:xfrm>
+          <a:prstGeom prst="line">
+            <a:avLst/>
+          </a:prstGeom>
+          <a:solidFill>
+            <a:schemeClr val="accent1"/>
+          </a:solidFill>
+          <a:ln w="38100" cap="flat" cmpd="sng" algn="ctr">
+            <a:solidFill>
+              <a:schemeClr val="tx1"/>
+            </a:solidFill>
+            <a:prstDash val="solid"/>
+            <a:round/>
+            <a:headEnd type="none" w="med" len="med"/>
+            <a:tailEnd type="none" w="med" len="med"/>
+          </a:ln>
+          <a:effectLst/>
+        </p:spPr>
+      </p:cxnSp>
+      <p:sp>
+        <p:nvSpPr>
+          <p:cNvPr id="1057" name="TextBox 1056"/>
+          <p:cNvSpPr txBox="1"/>
+          <p:nvPr/>
+        </p:nvSpPr>
+        <p:spPr>
+          <a:xfrm>
+            <a:off x="3912243" y="4399973"/>
+            <a:ext cx="1267952" cy="307777"/>
           </a:xfrm>
           <a:prstGeom prst="rect">
             <a:avLst/>
           </a:prstGeom>
           <a:noFill/>
-          <a:extLst>
-            <a:ext uri="{909E8E84-426E-40DD-AFC4-6F175D3DCCD1}">
-              <a14:hiddenFill xmlns:a14="http://schemas.microsoft.com/office/drawing/2010/main">
-                <a:solidFill>
-                  <a:srgbClr val="FFFFFF"/>
-                </a:solidFill>
-              </a14:hiddenFill>
-            </a:ext>
-          </a:extLst>
+          <a:ln w="38100">
+            <a:noFill/>
+          </a:ln>
         </p:spPr>
-      </p:pic>
+        <p:txBody>
+          <a:bodyPr wrap="square" rtlCol="0">
+            <a:spAutoFit/>
+          </a:bodyPr>
+          <a:lstStyle/>
+          <a:p>
+            <a:r>
+              <a:rPr lang="ko-KR" altLang="en-US" b="1" dirty="0" smtClean="0">
+                <a:latin typeface="Goudy Old Style" panose="02020502050305020303" pitchFamily="18" charset="0"/>
+              </a:rPr>
+              <a:t>정렬 방식</a:t>
+            </a:r>
+            <a:endParaRPr lang="ko-KR" altLang="en-US" b="1" dirty="0">
+              <a:latin typeface="Goudy Old Style" panose="02020502050305020303" pitchFamily="18" charset="0"/>
+            </a:endParaRPr>
+          </a:p>
+        </p:txBody>
+      </p:sp>
     </p:spTree>
     <p:extLst>
       <p:ext uri="{BB962C8B-B14F-4D97-AF65-F5344CB8AC3E}">
@@ -3306,45 +5154,6 @@
       </p:sp>
       <p:sp>
         <p:nvSpPr>
-          <p:cNvPr id="3" name="내용 개체 틀 2"/>
-          <p:cNvSpPr>
-            <a:spLocks noGrp="1"/>
-          </p:cNvSpPr>
-          <p:nvPr>
-            <p:ph idx="1"/>
-          </p:nvPr>
-        </p:nvSpPr>
-        <p:spPr/>
-        <p:txBody>
-          <a:bodyPr/>
-          <a:lstStyle/>
-          <a:p>
-            <a:pPr marL="0" indent="0">
-              <a:buNone/>
-            </a:pPr>
-            <a:r>
-              <a:rPr lang="ko-KR" altLang="en-US" dirty="0" smtClean="0">
-                <a:latin typeface="맑은 고딕" pitchFamily="50" charset="-127"/>
-                <a:ea typeface="맑은 고딕" pitchFamily="50" charset="-127"/>
-              </a:rPr>
-              <a:t>예제</a:t>
-            </a:r>
-            <a:r>
-              <a:rPr lang="en-US" altLang="ko-KR" dirty="0" smtClean="0">
-                <a:latin typeface="맑은 고딕" pitchFamily="50" charset="-127"/>
-                <a:ea typeface="맑은 고딕" pitchFamily="50" charset="-127"/>
-              </a:rPr>
-              <a:t>) </a:t>
-            </a:r>
-            <a:endParaRPr lang="ko-KR" altLang="en-US" dirty="0">
-              <a:latin typeface="맑은 고딕" pitchFamily="50" charset="-127"/>
-              <a:ea typeface="맑은 고딕" pitchFamily="50" charset="-127"/>
-            </a:endParaRPr>
-          </a:p>
-        </p:txBody>
-      </p:sp>
-      <p:sp>
-        <p:nvSpPr>
           <p:cNvPr id="4" name="바닥글 개체 틀 3"/>
           <p:cNvSpPr>
             <a:spLocks noGrp="1"/>
@@ -3367,70 +5176,1392 @@
           </a:p>
         </p:txBody>
       </p:sp>
-      <p:pic>
-        <p:nvPicPr>
-          <p:cNvPr id="20" name="Picture 2"/>
-          <p:cNvPicPr>
-            <a:picLocks noChangeAspect="1" noChangeArrowheads="1"/>
-          </p:cNvPicPr>
+      <p:sp>
+        <p:nvSpPr>
+          <p:cNvPr id="12" name="모서리가 둥근 직사각형 11"/>
+          <p:cNvSpPr/>
           <p:nvPr/>
-        </p:nvPicPr>
-        <p:blipFill>
-          <a:blip r:embed="rId2">
-            <a:extLst>
-              <a:ext uri="{28A0092B-C50C-407E-A947-70E740481C1C}">
-                <a14:useLocalDpi xmlns:a14="http://schemas.microsoft.com/office/drawing/2010/main" val="0"/>
-              </a:ext>
-            </a:extLst>
-          </a:blip>
-          <a:srcRect/>
-          <a:stretch>
-            <a:fillRect/>
-          </a:stretch>
-        </p:blipFill>
+        </p:nvSpPr>
         <p:spPr bwMode="auto">
           <a:xfrm>
-            <a:off x="1212850" y="1310215"/>
-            <a:ext cx="6718300" cy="4949825"/>
+            <a:off x="3414532" y="1180618"/>
+            <a:ext cx="1794076" cy="555585"/>
           </a:xfrm>
-          <a:prstGeom prst="rect">
+          <a:prstGeom prst="roundRect">
             <a:avLst/>
           </a:prstGeom>
-          <a:noFill/>
+          <a:solidFill>
+            <a:srgbClr val="FFFFFB"/>
+          </a:solidFill>
           <a:ln>
-            <a:noFill/>
+            <a:headEnd type="none" w="med" len="med"/>
+            <a:tailEnd type="none" w="med" len="med"/>
+          </a:ln>
+        </p:spPr>
+        <p:style>
+          <a:lnRef idx="2">
+            <a:schemeClr val="accent2"/>
+          </a:lnRef>
+          <a:fillRef idx="1">
+            <a:schemeClr val="lt1"/>
+          </a:fillRef>
+          <a:effectRef idx="0">
+            <a:schemeClr val="accent2"/>
+          </a:effectRef>
+          <a:fontRef idx="minor">
+            <a:schemeClr val="dk1"/>
+          </a:fontRef>
+        </p:style>
+        <p:txBody>
+          <a:bodyPr vert="horz" wrap="none" lIns="90000" tIns="46800" rIns="90000" bIns="46800" numCol="1" rtlCol="0" anchor="ctr" anchorCtr="0" compatLnSpc="1">
+            <a:prstTxWarp prst="textNoShape">
+              <a:avLst/>
+            </a:prstTxWarp>
+          </a:bodyPr>
+          <a:lstStyle/>
+          <a:p>
+            <a:pPr marL="0" marR="0" indent="0" algn="ctr" defTabSz="914400" rtl="0" eaLnBrk="0" fontAlgn="base" latinLnBrk="0" hangingPunct="0">
+              <a:lnSpc>
+                <a:spcPct val="100000"/>
+              </a:lnSpc>
+              <a:spcBef>
+                <a:spcPct val="0"/>
+              </a:spcBef>
+              <a:spcAft>
+                <a:spcPct val="0"/>
+              </a:spcAft>
+              <a:buClrTx/>
+              <a:buSzTx/>
+              <a:buFontTx/>
+              <a:buNone/>
+              <a:tabLst/>
+            </a:pPr>
+            <a:r>
+              <a:rPr kumimoji="0" lang="ko-KR" altLang="en-US" b="1" i="0" u="none" strike="noStrike" cap="none" normalizeH="0" baseline="0" dirty="0" smtClean="0">
+                <a:ln>
+                  <a:noFill/>
+                </a:ln>
+                <a:solidFill>
+                  <a:srgbClr val="464517"/>
+                </a:solidFill>
+                <a:effectLst/>
+                <a:latin typeface="Goudy Old Style" panose="02020502050305020303" pitchFamily="18" charset="0"/>
+                <a:ea typeface="맑은 고딕" pitchFamily="50" charset="-127"/>
+              </a:rPr>
+              <a:t>사용자</a:t>
+            </a:r>
+            <a:endParaRPr kumimoji="0" lang="ko-KR" altLang="en-US" b="1" i="0" u="none" strike="noStrike" cap="none" normalizeH="0" baseline="0" dirty="0" smtClean="0">
+              <a:ln>
+                <a:noFill/>
+              </a:ln>
+              <a:solidFill>
+                <a:srgbClr val="464517"/>
+              </a:solidFill>
+              <a:effectLst/>
+              <a:latin typeface="Goudy Old Style" panose="02020502050305020303" pitchFamily="18" charset="0"/>
+              <a:ea typeface="맑은 고딕" pitchFamily="50" charset="-127"/>
+            </a:endParaRPr>
+          </a:p>
+        </p:txBody>
+      </p:sp>
+      <p:sp>
+        <p:nvSpPr>
+          <p:cNvPr id="14" name="모서리가 둥근 직사각형 13"/>
+          <p:cNvSpPr/>
+          <p:nvPr/>
+        </p:nvSpPr>
+        <p:spPr bwMode="auto">
+          <a:xfrm>
+            <a:off x="3553429" y="2177970"/>
+            <a:ext cx="1516283" cy="555585"/>
+          </a:xfrm>
+          <a:prstGeom prst="roundRect">
+            <a:avLst/>
+          </a:prstGeom>
+          <a:solidFill>
+            <a:srgbClr val="FFFFFB"/>
+          </a:solidFill>
+          <a:ln>
+            <a:headEnd type="none" w="med" len="med"/>
+            <a:tailEnd type="none" w="med" len="med"/>
+          </a:ln>
+        </p:spPr>
+        <p:style>
+          <a:lnRef idx="2">
+            <a:schemeClr val="accent2"/>
+          </a:lnRef>
+          <a:fillRef idx="1">
+            <a:schemeClr val="lt1"/>
+          </a:fillRef>
+          <a:effectRef idx="0">
+            <a:schemeClr val="accent2"/>
+          </a:effectRef>
+          <a:fontRef idx="minor">
+            <a:schemeClr val="dk1"/>
+          </a:fontRef>
+        </p:style>
+        <p:txBody>
+          <a:bodyPr vert="horz" wrap="none" lIns="90000" tIns="46800" rIns="90000" bIns="46800" numCol="1" rtlCol="0" anchor="ctr" anchorCtr="0" compatLnSpc="1">
+            <a:prstTxWarp prst="textNoShape">
+              <a:avLst/>
+            </a:prstTxWarp>
+          </a:bodyPr>
+          <a:lstStyle/>
+          <a:p>
+            <a:pPr marL="0" marR="0" indent="0" algn="ctr" defTabSz="914400" rtl="0" eaLnBrk="0" fontAlgn="base" latinLnBrk="0" hangingPunct="0">
+              <a:lnSpc>
+                <a:spcPct val="100000"/>
+              </a:lnSpc>
+              <a:spcBef>
+                <a:spcPct val="0"/>
+              </a:spcBef>
+              <a:spcAft>
+                <a:spcPct val="0"/>
+              </a:spcAft>
+              <a:buClrTx/>
+              <a:buSzTx/>
+              <a:buFontTx/>
+              <a:buNone/>
+              <a:tabLst/>
+            </a:pPr>
+            <a:r>
+              <a:rPr kumimoji="0" lang="en-US" altLang="ko-KR" b="1" i="0" u="none" strike="noStrike" cap="none" normalizeH="0" baseline="0" dirty="0" smtClean="0">
+                <a:ln>
+                  <a:noFill/>
+                </a:ln>
+                <a:solidFill>
+                  <a:srgbClr val="464517"/>
+                </a:solidFill>
+                <a:effectLst/>
+                <a:latin typeface="Goudy Old Style" panose="02020502050305020303" pitchFamily="18" charset="0"/>
+                <a:ea typeface="맑은 고딕" pitchFamily="50" charset="-127"/>
+              </a:rPr>
+              <a:t>To do List</a:t>
+            </a:r>
+            <a:endParaRPr kumimoji="0" lang="ko-KR" altLang="en-US" b="1" i="0" u="none" strike="noStrike" cap="none" normalizeH="0" baseline="0" dirty="0" smtClean="0">
+              <a:ln>
+                <a:noFill/>
+              </a:ln>
+              <a:solidFill>
+                <a:srgbClr val="464517"/>
+              </a:solidFill>
+              <a:effectLst/>
+              <a:latin typeface="Goudy Old Style" panose="02020502050305020303" pitchFamily="18" charset="0"/>
+              <a:ea typeface="맑은 고딕" pitchFamily="50" charset="-127"/>
+            </a:endParaRPr>
+          </a:p>
+        </p:txBody>
+      </p:sp>
+      <p:sp>
+        <p:nvSpPr>
+          <p:cNvPr id="15" name="모서리가 둥근 직사각형 14"/>
+          <p:cNvSpPr/>
+          <p:nvPr/>
+        </p:nvSpPr>
+        <p:spPr bwMode="auto">
+          <a:xfrm>
+            <a:off x="5509550" y="3129566"/>
+            <a:ext cx="1192192" cy="435435"/>
+          </a:xfrm>
+          <a:prstGeom prst="roundRect">
+            <a:avLst/>
+          </a:prstGeom>
+          <a:solidFill>
+            <a:srgbClr val="FFFFFB"/>
+          </a:solidFill>
+          <a:ln>
+            <a:headEnd type="none" w="med" len="med"/>
+            <a:tailEnd type="none" w="med" len="med"/>
+          </a:ln>
+        </p:spPr>
+        <p:style>
+          <a:lnRef idx="2">
+            <a:schemeClr val="accent2"/>
+          </a:lnRef>
+          <a:fillRef idx="1">
+            <a:schemeClr val="lt1"/>
+          </a:fillRef>
+          <a:effectRef idx="0">
+            <a:schemeClr val="accent2"/>
+          </a:effectRef>
+          <a:fontRef idx="minor">
+            <a:schemeClr val="dk1"/>
+          </a:fontRef>
+        </p:style>
+        <p:txBody>
+          <a:bodyPr vert="horz" wrap="none" lIns="90000" tIns="46800" rIns="90000" bIns="46800" numCol="1" rtlCol="0" anchor="ctr" anchorCtr="0" compatLnSpc="1">
+            <a:prstTxWarp prst="textNoShape">
+              <a:avLst/>
+            </a:prstTxWarp>
+          </a:bodyPr>
+          <a:lstStyle/>
+          <a:p>
+            <a:pPr marL="0" marR="0" indent="0" algn="ctr" defTabSz="914400" rtl="0" eaLnBrk="0" fontAlgn="base" latinLnBrk="0" hangingPunct="0">
+              <a:lnSpc>
+                <a:spcPct val="100000"/>
+              </a:lnSpc>
+              <a:spcBef>
+                <a:spcPct val="0"/>
+              </a:spcBef>
+              <a:spcAft>
+                <a:spcPct val="0"/>
+              </a:spcAft>
+              <a:buClrTx/>
+              <a:buSzTx/>
+              <a:buFontTx/>
+              <a:buNone/>
+              <a:tabLst/>
+            </a:pPr>
+            <a:r>
+              <a:rPr kumimoji="0" lang="ko-KR" altLang="en-US" b="1" i="0" u="none" strike="noStrike" cap="none" normalizeH="0" baseline="0" smtClean="0">
+                <a:ln>
+                  <a:noFill/>
+                </a:ln>
+                <a:solidFill>
+                  <a:srgbClr val="464517"/>
+                </a:solidFill>
+                <a:effectLst/>
+                <a:latin typeface="Goudy Old Style" panose="02020502050305020303" pitchFamily="18" charset="0"/>
+                <a:ea typeface="맑은 고딕" pitchFamily="50" charset="-127"/>
+              </a:rPr>
+              <a:t>과목 삭제</a:t>
+            </a:r>
+            <a:endParaRPr kumimoji="0" lang="ko-KR" altLang="en-US" b="1" i="0" u="none" strike="noStrike" cap="none" normalizeH="0" baseline="0" dirty="0" smtClean="0">
+              <a:ln>
+                <a:noFill/>
+              </a:ln>
+              <a:solidFill>
+                <a:srgbClr val="464517"/>
+              </a:solidFill>
+              <a:effectLst/>
+              <a:latin typeface="Goudy Old Style" panose="02020502050305020303" pitchFamily="18" charset="0"/>
+              <a:ea typeface="맑은 고딕" pitchFamily="50" charset="-127"/>
+            </a:endParaRPr>
+          </a:p>
+        </p:txBody>
+      </p:sp>
+      <p:sp>
+        <p:nvSpPr>
+          <p:cNvPr id="16" name="모서리가 둥근 직사각형 15"/>
+          <p:cNvSpPr/>
+          <p:nvPr/>
+        </p:nvSpPr>
+        <p:spPr bwMode="auto">
+          <a:xfrm>
+            <a:off x="3715474" y="3129567"/>
+            <a:ext cx="1192192" cy="435435"/>
+          </a:xfrm>
+          <a:prstGeom prst="roundRect">
+            <a:avLst/>
+          </a:prstGeom>
+          <a:solidFill>
+            <a:srgbClr val="FFFFFB"/>
+          </a:solidFill>
+          <a:ln>
+            <a:headEnd type="none" w="med" len="med"/>
+            <a:tailEnd type="none" w="med" len="med"/>
+          </a:ln>
+        </p:spPr>
+        <p:style>
+          <a:lnRef idx="2">
+            <a:schemeClr val="accent2"/>
+          </a:lnRef>
+          <a:fillRef idx="1">
+            <a:schemeClr val="lt1"/>
+          </a:fillRef>
+          <a:effectRef idx="0">
+            <a:schemeClr val="accent2"/>
+          </a:effectRef>
+          <a:fontRef idx="minor">
+            <a:schemeClr val="dk1"/>
+          </a:fontRef>
+        </p:style>
+        <p:txBody>
+          <a:bodyPr vert="horz" wrap="none" lIns="90000" tIns="46800" rIns="90000" bIns="46800" numCol="1" rtlCol="0" anchor="ctr" anchorCtr="0" compatLnSpc="1">
+            <a:prstTxWarp prst="textNoShape">
+              <a:avLst/>
+            </a:prstTxWarp>
+          </a:bodyPr>
+          <a:lstStyle/>
+          <a:p>
+            <a:pPr marL="0" marR="0" indent="0" algn="ctr" defTabSz="914400" rtl="0" eaLnBrk="0" fontAlgn="base" latinLnBrk="0" hangingPunct="0">
+              <a:lnSpc>
+                <a:spcPct val="100000"/>
+              </a:lnSpc>
+              <a:spcBef>
+                <a:spcPct val="0"/>
+              </a:spcBef>
+              <a:spcAft>
+                <a:spcPct val="0"/>
+              </a:spcAft>
+              <a:buClrTx/>
+              <a:buSzTx/>
+              <a:buFontTx/>
+              <a:buNone/>
+              <a:tabLst/>
+            </a:pPr>
+            <a:r>
+              <a:rPr kumimoji="0" lang="ko-KR" altLang="en-US" b="1" i="0" u="none" strike="noStrike" cap="none" normalizeH="0" baseline="0" smtClean="0">
+                <a:ln>
+                  <a:noFill/>
+                </a:ln>
+                <a:solidFill>
+                  <a:srgbClr val="464517"/>
+                </a:solidFill>
+                <a:effectLst/>
+                <a:latin typeface="Goudy Old Style" panose="02020502050305020303" pitchFamily="18" charset="0"/>
+                <a:ea typeface="맑은 고딕" pitchFamily="50" charset="-127"/>
+              </a:rPr>
+              <a:t>과목 변경</a:t>
+            </a:r>
+            <a:endParaRPr kumimoji="0" lang="ko-KR" altLang="en-US" b="1" i="0" u="none" strike="noStrike" cap="none" normalizeH="0" baseline="0" dirty="0" smtClean="0">
+              <a:ln>
+                <a:noFill/>
+              </a:ln>
+              <a:solidFill>
+                <a:srgbClr val="464517"/>
+              </a:solidFill>
+              <a:effectLst/>
+              <a:latin typeface="Goudy Old Style" panose="02020502050305020303" pitchFamily="18" charset="0"/>
+              <a:ea typeface="맑은 고딕" pitchFamily="50" charset="-127"/>
+            </a:endParaRPr>
+          </a:p>
+        </p:txBody>
+      </p:sp>
+      <p:sp>
+        <p:nvSpPr>
+          <p:cNvPr id="17" name="모서리가 둥근 직사각형 16"/>
+          <p:cNvSpPr/>
+          <p:nvPr/>
+        </p:nvSpPr>
+        <p:spPr bwMode="auto">
+          <a:xfrm>
+            <a:off x="1921398" y="3129568"/>
+            <a:ext cx="1192192" cy="435435"/>
+          </a:xfrm>
+          <a:prstGeom prst="roundRect">
+            <a:avLst/>
+          </a:prstGeom>
+          <a:solidFill>
+            <a:srgbClr val="FFFFFB"/>
+          </a:solidFill>
+          <a:ln>
+            <a:headEnd type="none" w="med" len="med"/>
+            <a:tailEnd type="none" w="med" len="med"/>
+          </a:ln>
+        </p:spPr>
+        <p:style>
+          <a:lnRef idx="2">
+            <a:schemeClr val="accent2"/>
+          </a:lnRef>
+          <a:fillRef idx="1">
+            <a:schemeClr val="lt1"/>
+          </a:fillRef>
+          <a:effectRef idx="0">
+            <a:schemeClr val="accent2"/>
+          </a:effectRef>
+          <a:fontRef idx="minor">
+            <a:schemeClr val="dk1"/>
+          </a:fontRef>
+        </p:style>
+        <p:txBody>
+          <a:bodyPr vert="horz" wrap="none" lIns="90000" tIns="46800" rIns="90000" bIns="46800" numCol="1" rtlCol="0" anchor="ctr" anchorCtr="0" compatLnSpc="1">
+            <a:prstTxWarp prst="textNoShape">
+              <a:avLst/>
+            </a:prstTxWarp>
+          </a:bodyPr>
+          <a:lstStyle/>
+          <a:p>
+            <a:pPr marL="0" marR="0" indent="0" algn="ctr" defTabSz="914400" rtl="0" eaLnBrk="0" fontAlgn="base" latinLnBrk="0" hangingPunct="0">
+              <a:lnSpc>
+                <a:spcPct val="100000"/>
+              </a:lnSpc>
+              <a:spcBef>
+                <a:spcPct val="0"/>
+              </a:spcBef>
+              <a:spcAft>
+                <a:spcPct val="0"/>
+              </a:spcAft>
+              <a:buClrTx/>
+              <a:buSzTx/>
+              <a:buFontTx/>
+              <a:buNone/>
+              <a:tabLst/>
+            </a:pPr>
+            <a:r>
+              <a:rPr lang="ko-KR" altLang="en-US" b="1" dirty="0" smtClean="0">
+                <a:solidFill>
+                  <a:srgbClr val="464517"/>
+                </a:solidFill>
+                <a:latin typeface="Goudy Old Style" panose="02020502050305020303" pitchFamily="18" charset="0"/>
+                <a:ea typeface="맑은 고딕" pitchFamily="50" charset="-127"/>
+              </a:rPr>
+              <a:t>과목 추가</a:t>
+            </a:r>
+            <a:endParaRPr kumimoji="0" lang="ko-KR" altLang="en-US" b="1" i="0" u="none" strike="noStrike" cap="none" normalizeH="0" baseline="0" dirty="0" smtClean="0">
+              <a:ln>
+                <a:noFill/>
+              </a:ln>
+              <a:solidFill>
+                <a:srgbClr val="464517"/>
+              </a:solidFill>
+              <a:effectLst/>
+              <a:latin typeface="Goudy Old Style" panose="02020502050305020303" pitchFamily="18" charset="0"/>
+              <a:ea typeface="맑은 고딕" pitchFamily="50" charset="-127"/>
+            </a:endParaRPr>
+          </a:p>
+        </p:txBody>
+      </p:sp>
+      <p:sp>
+        <p:nvSpPr>
+          <p:cNvPr id="18" name="모서리가 둥근 직사각형 17"/>
+          <p:cNvSpPr/>
+          <p:nvPr/>
+        </p:nvSpPr>
+        <p:spPr bwMode="auto">
+          <a:xfrm>
+            <a:off x="3553429" y="3961014"/>
+            <a:ext cx="1516283" cy="437366"/>
+          </a:xfrm>
+          <a:prstGeom prst="roundRect">
+            <a:avLst/>
+          </a:prstGeom>
+          <a:solidFill>
+            <a:srgbClr val="FFFFFB"/>
+          </a:solidFill>
+          <a:ln>
+            <a:headEnd type="none" w="med" len="med"/>
+            <a:tailEnd type="none" w="med" len="med"/>
+          </a:ln>
+        </p:spPr>
+        <p:style>
+          <a:lnRef idx="2">
+            <a:schemeClr val="accent2"/>
+          </a:lnRef>
+          <a:fillRef idx="1">
+            <a:schemeClr val="lt1"/>
+          </a:fillRef>
+          <a:effectRef idx="0">
+            <a:schemeClr val="accent2"/>
+          </a:effectRef>
+          <a:fontRef idx="minor">
+            <a:schemeClr val="dk1"/>
+          </a:fontRef>
+        </p:style>
+        <p:txBody>
+          <a:bodyPr vert="horz" wrap="none" lIns="90000" tIns="46800" rIns="90000" bIns="46800" numCol="1" rtlCol="0" anchor="ctr" anchorCtr="0" compatLnSpc="1">
+            <a:prstTxWarp prst="textNoShape">
+              <a:avLst/>
+            </a:prstTxWarp>
+          </a:bodyPr>
+          <a:lstStyle/>
+          <a:p>
+            <a:pPr marL="0" marR="0" indent="0" algn="ctr" defTabSz="914400" rtl="0" eaLnBrk="0" fontAlgn="base" latinLnBrk="0" hangingPunct="0">
+              <a:lnSpc>
+                <a:spcPct val="100000"/>
+              </a:lnSpc>
+              <a:spcBef>
+                <a:spcPct val="0"/>
+              </a:spcBef>
+              <a:spcAft>
+                <a:spcPct val="0"/>
+              </a:spcAft>
+              <a:buClrTx/>
+              <a:buSzTx/>
+              <a:buFontTx/>
+              <a:buNone/>
+              <a:tabLst/>
+            </a:pPr>
+            <a:r>
+              <a:rPr kumimoji="0" lang="ko-KR" altLang="en-US" b="1" i="0" u="none" strike="noStrike" cap="none" normalizeH="0" baseline="0" dirty="0" smtClean="0">
+                <a:ln>
+                  <a:noFill/>
+                </a:ln>
+                <a:solidFill>
+                  <a:srgbClr val="464517"/>
+                </a:solidFill>
+                <a:effectLst/>
+                <a:latin typeface="Goudy Old Style" panose="02020502050305020303" pitchFamily="18" charset="0"/>
+                <a:ea typeface="맑은 고딕" pitchFamily="50" charset="-127"/>
+              </a:rPr>
+              <a:t>과목 선택</a:t>
+            </a:r>
+            <a:endParaRPr kumimoji="0" lang="ko-KR" altLang="en-US" b="1" i="0" u="none" strike="noStrike" cap="none" normalizeH="0" baseline="0" dirty="0" smtClean="0">
+              <a:ln>
+                <a:noFill/>
+              </a:ln>
+              <a:solidFill>
+                <a:srgbClr val="464517"/>
+              </a:solidFill>
+              <a:effectLst/>
+              <a:latin typeface="Goudy Old Style" panose="02020502050305020303" pitchFamily="18" charset="0"/>
+              <a:ea typeface="맑은 고딕" pitchFamily="50" charset="-127"/>
+            </a:endParaRPr>
+          </a:p>
+        </p:txBody>
+      </p:sp>
+      <p:sp>
+        <p:nvSpPr>
+          <p:cNvPr id="19" name="모서리가 둥근 직사각형 18"/>
+          <p:cNvSpPr/>
+          <p:nvPr/>
+        </p:nvSpPr>
+        <p:spPr bwMode="auto">
+          <a:xfrm>
+            <a:off x="6460602" y="5629481"/>
+            <a:ext cx="1192192" cy="435435"/>
+          </a:xfrm>
+          <a:prstGeom prst="roundRect">
+            <a:avLst/>
+          </a:prstGeom>
+          <a:solidFill>
+            <a:srgbClr val="FFFFFB"/>
+          </a:solidFill>
+          <a:ln>
+            <a:headEnd type="none" w="med" len="med"/>
+            <a:tailEnd type="none" w="med" len="med"/>
+          </a:ln>
+        </p:spPr>
+        <p:style>
+          <a:lnRef idx="2">
+            <a:schemeClr val="accent2"/>
+          </a:lnRef>
+          <a:fillRef idx="1">
+            <a:schemeClr val="lt1"/>
+          </a:fillRef>
+          <a:effectRef idx="0">
+            <a:schemeClr val="accent2"/>
+          </a:effectRef>
+          <a:fontRef idx="minor">
+            <a:schemeClr val="dk1"/>
+          </a:fontRef>
+        </p:style>
+        <p:txBody>
+          <a:bodyPr vert="horz" wrap="none" lIns="90000" tIns="46800" rIns="90000" bIns="46800" numCol="1" rtlCol="0" anchor="ctr" anchorCtr="0" compatLnSpc="1">
+            <a:prstTxWarp prst="textNoShape">
+              <a:avLst/>
+            </a:prstTxWarp>
+          </a:bodyPr>
+          <a:lstStyle/>
+          <a:p>
+            <a:pPr marL="0" marR="0" indent="0" algn="ctr" defTabSz="914400" rtl="0" eaLnBrk="0" fontAlgn="base" latinLnBrk="0" hangingPunct="0">
+              <a:lnSpc>
+                <a:spcPct val="100000"/>
+              </a:lnSpc>
+              <a:spcBef>
+                <a:spcPct val="0"/>
+              </a:spcBef>
+              <a:spcAft>
+                <a:spcPct val="0"/>
+              </a:spcAft>
+              <a:buClrTx/>
+              <a:buSzTx/>
+              <a:buFontTx/>
+              <a:buNone/>
+              <a:tabLst/>
+            </a:pPr>
+            <a:r>
+              <a:rPr kumimoji="0" lang="en-US" altLang="ko-KR" b="1" i="0" u="none" strike="noStrike" cap="none" normalizeH="0" baseline="0" dirty="0" smtClean="0">
+                <a:ln>
+                  <a:noFill/>
+                </a:ln>
+                <a:solidFill>
+                  <a:srgbClr val="464517"/>
+                </a:solidFill>
+                <a:effectLst/>
+                <a:latin typeface="Goudy Old Style" panose="02020502050305020303" pitchFamily="18" charset="0"/>
+                <a:ea typeface="맑은 고딕" pitchFamily="50" charset="-127"/>
+              </a:rPr>
+              <a:t>To do </a:t>
+            </a:r>
+            <a:r>
+              <a:rPr kumimoji="0" lang="ko-KR" altLang="en-US" b="1" i="0" u="none" strike="noStrike" cap="none" normalizeH="0" baseline="0" dirty="0" smtClean="0">
+                <a:ln>
+                  <a:noFill/>
+                </a:ln>
+                <a:solidFill>
+                  <a:srgbClr val="464517"/>
+                </a:solidFill>
+                <a:effectLst/>
+                <a:latin typeface="Goudy Old Style" panose="02020502050305020303" pitchFamily="18" charset="0"/>
+                <a:ea typeface="맑은 고딕" pitchFamily="50" charset="-127"/>
+              </a:rPr>
+              <a:t>정렬</a:t>
+            </a:r>
+            <a:endParaRPr kumimoji="0" lang="ko-KR" altLang="en-US" b="1" i="0" u="none" strike="noStrike" cap="none" normalizeH="0" baseline="0" dirty="0" smtClean="0">
+              <a:ln>
+                <a:noFill/>
+              </a:ln>
+              <a:solidFill>
+                <a:srgbClr val="464517"/>
+              </a:solidFill>
+              <a:effectLst/>
+              <a:latin typeface="Goudy Old Style" panose="02020502050305020303" pitchFamily="18" charset="0"/>
+              <a:ea typeface="맑은 고딕" pitchFamily="50" charset="-127"/>
+            </a:endParaRPr>
+          </a:p>
+        </p:txBody>
+      </p:sp>
+      <p:sp>
+        <p:nvSpPr>
+          <p:cNvPr id="22" name="모서리가 둥근 직사각형 21"/>
+          <p:cNvSpPr/>
+          <p:nvPr/>
+        </p:nvSpPr>
+        <p:spPr bwMode="auto">
+          <a:xfrm>
+            <a:off x="997353" y="4792460"/>
+            <a:ext cx="1192192" cy="435435"/>
+          </a:xfrm>
+          <a:prstGeom prst="roundRect">
+            <a:avLst/>
+          </a:prstGeom>
+          <a:solidFill>
+            <a:srgbClr val="FFFFFB"/>
+          </a:solidFill>
+          <a:ln>
+            <a:headEnd type="none" w="med" len="med"/>
+            <a:tailEnd type="none" w="med" len="med"/>
+          </a:ln>
+        </p:spPr>
+        <p:style>
+          <a:lnRef idx="2">
+            <a:schemeClr val="accent2"/>
+          </a:lnRef>
+          <a:fillRef idx="1">
+            <a:schemeClr val="lt1"/>
+          </a:fillRef>
+          <a:effectRef idx="0">
+            <a:schemeClr val="accent2"/>
+          </a:effectRef>
+          <a:fontRef idx="minor">
+            <a:schemeClr val="dk1"/>
+          </a:fontRef>
+        </p:style>
+        <p:txBody>
+          <a:bodyPr vert="horz" wrap="none" lIns="90000" tIns="46800" rIns="90000" bIns="46800" numCol="1" rtlCol="0" anchor="ctr" anchorCtr="0" compatLnSpc="1">
+            <a:prstTxWarp prst="textNoShape">
+              <a:avLst/>
+            </a:prstTxWarp>
+          </a:bodyPr>
+          <a:lstStyle/>
+          <a:p>
+            <a:pPr marL="0" marR="0" indent="0" algn="ctr" defTabSz="914400" rtl="0" eaLnBrk="0" fontAlgn="base" latinLnBrk="0" hangingPunct="0">
+              <a:lnSpc>
+                <a:spcPct val="100000"/>
+              </a:lnSpc>
+              <a:spcBef>
+                <a:spcPct val="0"/>
+              </a:spcBef>
+              <a:spcAft>
+                <a:spcPct val="0"/>
+              </a:spcAft>
+              <a:buClrTx/>
+              <a:buSzTx/>
+              <a:buFontTx/>
+              <a:buNone/>
+              <a:tabLst/>
+            </a:pPr>
+            <a:r>
+              <a:rPr lang="ko-KR" altLang="en-US" b="1" dirty="0" smtClean="0">
+                <a:solidFill>
+                  <a:srgbClr val="464517"/>
+                </a:solidFill>
+                <a:latin typeface="Goudy Old Style" panose="02020502050305020303" pitchFamily="18" charset="0"/>
+                <a:ea typeface="맑은 고딕" pitchFamily="50" charset="-127"/>
+              </a:rPr>
+              <a:t>추가</a:t>
+            </a:r>
+            <a:endParaRPr kumimoji="0" lang="ko-KR" altLang="en-US" b="1" i="0" u="none" strike="noStrike" cap="none" normalizeH="0" baseline="0" dirty="0" smtClean="0">
+              <a:ln>
+                <a:noFill/>
+              </a:ln>
+              <a:solidFill>
+                <a:srgbClr val="464517"/>
+              </a:solidFill>
+              <a:effectLst/>
+              <a:latin typeface="Goudy Old Style" panose="02020502050305020303" pitchFamily="18" charset="0"/>
+              <a:ea typeface="맑은 고딕" pitchFamily="50" charset="-127"/>
+            </a:endParaRPr>
+          </a:p>
+        </p:txBody>
+      </p:sp>
+      <p:sp>
+        <p:nvSpPr>
+          <p:cNvPr id="23" name="모서리가 둥근 직사각형 22"/>
+          <p:cNvSpPr/>
+          <p:nvPr/>
+        </p:nvSpPr>
+        <p:spPr bwMode="auto">
+          <a:xfrm>
+            <a:off x="4639519" y="4752222"/>
+            <a:ext cx="1192192" cy="435435"/>
+          </a:xfrm>
+          <a:prstGeom prst="roundRect">
+            <a:avLst/>
+          </a:prstGeom>
+          <a:solidFill>
+            <a:srgbClr val="FFFFFB"/>
+          </a:solidFill>
+          <a:ln>
+            <a:headEnd type="none" w="med" len="med"/>
+            <a:tailEnd type="none" w="med" len="med"/>
+          </a:ln>
+        </p:spPr>
+        <p:style>
+          <a:lnRef idx="2">
+            <a:schemeClr val="accent2"/>
+          </a:lnRef>
+          <a:fillRef idx="1">
+            <a:schemeClr val="lt1"/>
+          </a:fillRef>
+          <a:effectRef idx="0">
+            <a:schemeClr val="accent2"/>
+          </a:effectRef>
+          <a:fontRef idx="minor">
+            <a:schemeClr val="dk1"/>
+          </a:fontRef>
+        </p:style>
+        <p:txBody>
+          <a:bodyPr vert="horz" wrap="none" lIns="90000" tIns="46800" rIns="90000" bIns="46800" numCol="1" rtlCol="0" anchor="ctr" anchorCtr="0" compatLnSpc="1">
+            <a:prstTxWarp prst="textNoShape">
+              <a:avLst/>
+            </a:prstTxWarp>
+          </a:bodyPr>
+          <a:lstStyle/>
+          <a:p>
+            <a:pPr marL="0" marR="0" indent="0" algn="ctr" defTabSz="914400" rtl="0" eaLnBrk="0" fontAlgn="base" latinLnBrk="0" hangingPunct="0">
+              <a:lnSpc>
+                <a:spcPct val="100000"/>
+              </a:lnSpc>
+              <a:spcBef>
+                <a:spcPct val="0"/>
+              </a:spcBef>
+              <a:spcAft>
+                <a:spcPct val="0"/>
+              </a:spcAft>
+              <a:buClrTx/>
+              <a:buSzTx/>
+              <a:buFontTx/>
+              <a:buNone/>
+              <a:tabLst/>
+            </a:pPr>
+            <a:r>
+              <a:rPr kumimoji="0" lang="ko-KR" altLang="en-US" b="1" i="0" u="none" strike="noStrike" cap="none" normalizeH="0" baseline="0" dirty="0" smtClean="0">
+                <a:ln>
+                  <a:noFill/>
+                </a:ln>
+                <a:solidFill>
+                  <a:srgbClr val="464517"/>
+                </a:solidFill>
+                <a:effectLst/>
+                <a:latin typeface="Goudy Old Style" panose="02020502050305020303" pitchFamily="18" charset="0"/>
+                <a:ea typeface="맑은 고딕" pitchFamily="50" charset="-127"/>
+              </a:rPr>
+              <a:t>삭제</a:t>
+            </a:r>
+            <a:endParaRPr kumimoji="0" lang="ko-KR" altLang="en-US" b="1" i="0" u="none" strike="noStrike" cap="none" normalizeH="0" baseline="0" dirty="0" smtClean="0">
+              <a:ln>
+                <a:noFill/>
+              </a:ln>
+              <a:solidFill>
+                <a:srgbClr val="464517"/>
+              </a:solidFill>
+              <a:effectLst/>
+              <a:latin typeface="Goudy Old Style" panose="02020502050305020303" pitchFamily="18" charset="0"/>
+              <a:ea typeface="맑은 고딕" pitchFamily="50" charset="-127"/>
+            </a:endParaRPr>
+          </a:p>
+        </p:txBody>
+      </p:sp>
+      <p:sp>
+        <p:nvSpPr>
+          <p:cNvPr id="24" name="모서리가 둥근 직사각형 23"/>
+          <p:cNvSpPr/>
+          <p:nvPr/>
+        </p:nvSpPr>
+        <p:spPr bwMode="auto">
+          <a:xfrm>
+            <a:off x="2818436" y="4792461"/>
+            <a:ext cx="1192192" cy="435435"/>
+          </a:xfrm>
+          <a:prstGeom prst="roundRect">
+            <a:avLst/>
+          </a:prstGeom>
+          <a:solidFill>
+            <a:srgbClr val="FFFFFB"/>
+          </a:solidFill>
+          <a:ln>
+            <a:headEnd type="none" w="med" len="med"/>
+            <a:tailEnd type="none" w="med" len="med"/>
+          </a:ln>
+        </p:spPr>
+        <p:style>
+          <a:lnRef idx="2">
+            <a:schemeClr val="accent2"/>
+          </a:lnRef>
+          <a:fillRef idx="1">
+            <a:schemeClr val="lt1"/>
+          </a:fillRef>
+          <a:effectRef idx="0">
+            <a:schemeClr val="accent2"/>
+          </a:effectRef>
+          <a:fontRef idx="minor">
+            <a:schemeClr val="dk1"/>
+          </a:fontRef>
+        </p:style>
+        <p:txBody>
+          <a:bodyPr vert="horz" wrap="none" lIns="90000" tIns="46800" rIns="90000" bIns="46800" numCol="1" rtlCol="0" anchor="ctr" anchorCtr="0" compatLnSpc="1">
+            <a:prstTxWarp prst="textNoShape">
+              <a:avLst/>
+            </a:prstTxWarp>
+          </a:bodyPr>
+          <a:lstStyle/>
+          <a:p>
+            <a:pPr marL="0" marR="0" indent="0" algn="ctr" defTabSz="914400" rtl="0" eaLnBrk="0" fontAlgn="base" latinLnBrk="0" hangingPunct="0">
+              <a:lnSpc>
+                <a:spcPct val="100000"/>
+              </a:lnSpc>
+              <a:spcBef>
+                <a:spcPct val="0"/>
+              </a:spcBef>
+              <a:spcAft>
+                <a:spcPct val="0"/>
+              </a:spcAft>
+              <a:buClrTx/>
+              <a:buSzTx/>
+              <a:buFontTx/>
+              <a:buNone/>
+              <a:tabLst/>
+            </a:pPr>
+            <a:r>
+              <a:rPr kumimoji="0" lang="ko-KR" altLang="en-US" b="1" i="0" u="none" strike="noStrike" cap="none" normalizeH="0" baseline="0" dirty="0" smtClean="0">
+                <a:ln>
+                  <a:noFill/>
+                </a:ln>
+                <a:solidFill>
+                  <a:srgbClr val="464517"/>
+                </a:solidFill>
+                <a:effectLst/>
+                <a:latin typeface="Goudy Old Style" panose="02020502050305020303" pitchFamily="18" charset="0"/>
+                <a:ea typeface="맑은 고딕" pitchFamily="50" charset="-127"/>
+              </a:rPr>
+              <a:t>변경</a:t>
+            </a:r>
+            <a:endParaRPr kumimoji="0" lang="ko-KR" altLang="en-US" b="1" i="0" u="none" strike="noStrike" cap="none" normalizeH="0" baseline="0" dirty="0" smtClean="0">
+              <a:ln>
+                <a:noFill/>
+              </a:ln>
+              <a:solidFill>
+                <a:srgbClr val="464517"/>
+              </a:solidFill>
+              <a:effectLst/>
+              <a:latin typeface="Goudy Old Style" panose="02020502050305020303" pitchFamily="18" charset="0"/>
+              <a:ea typeface="맑은 고딕" pitchFamily="50" charset="-127"/>
+            </a:endParaRPr>
+          </a:p>
+        </p:txBody>
+      </p:sp>
+      <p:sp>
+        <p:nvSpPr>
+          <p:cNvPr id="25" name="모서리가 둥근 직사각형 24"/>
+          <p:cNvSpPr/>
+          <p:nvPr/>
+        </p:nvSpPr>
+        <p:spPr bwMode="auto">
+          <a:xfrm>
+            <a:off x="6460602" y="4794662"/>
+            <a:ext cx="1192192" cy="435435"/>
+          </a:xfrm>
+          <a:prstGeom prst="roundRect">
+            <a:avLst/>
+          </a:prstGeom>
+          <a:solidFill>
+            <a:srgbClr val="FFFFFB"/>
+          </a:solidFill>
+          <a:ln>
+            <a:headEnd type="none" w="med" len="med"/>
+            <a:tailEnd type="none" w="med" len="med"/>
+          </a:ln>
+        </p:spPr>
+        <p:style>
+          <a:lnRef idx="2">
+            <a:schemeClr val="accent2"/>
+          </a:lnRef>
+          <a:fillRef idx="1">
+            <a:schemeClr val="lt1"/>
+          </a:fillRef>
+          <a:effectRef idx="0">
+            <a:schemeClr val="accent2"/>
+          </a:effectRef>
+          <a:fontRef idx="minor">
+            <a:schemeClr val="dk1"/>
+          </a:fontRef>
+        </p:style>
+        <p:txBody>
+          <a:bodyPr vert="horz" wrap="none" lIns="90000" tIns="46800" rIns="90000" bIns="46800" numCol="1" rtlCol="0" anchor="ctr" anchorCtr="0" compatLnSpc="1">
+            <a:prstTxWarp prst="textNoShape">
+              <a:avLst/>
+            </a:prstTxWarp>
+          </a:bodyPr>
+          <a:lstStyle/>
+          <a:p>
+            <a:pPr marL="0" marR="0" indent="0" algn="ctr" defTabSz="914400" rtl="0" eaLnBrk="0" fontAlgn="base" latinLnBrk="0" hangingPunct="0">
+              <a:lnSpc>
+                <a:spcPct val="100000"/>
+              </a:lnSpc>
+              <a:spcBef>
+                <a:spcPct val="0"/>
+              </a:spcBef>
+              <a:spcAft>
+                <a:spcPct val="0"/>
+              </a:spcAft>
+              <a:buClrTx/>
+              <a:buSzTx/>
+              <a:buFontTx/>
+              <a:buNone/>
+              <a:tabLst/>
+            </a:pPr>
+            <a:r>
+              <a:rPr lang="ko-KR" altLang="en-US" b="1" dirty="0" smtClean="0">
+                <a:solidFill>
+                  <a:srgbClr val="464517"/>
+                </a:solidFill>
+                <a:latin typeface="Goudy Old Style" panose="02020502050305020303" pitchFamily="18" charset="0"/>
+                <a:ea typeface="맑은 고딕" pitchFamily="50" charset="-127"/>
+              </a:rPr>
+              <a:t>정렬</a:t>
+            </a:r>
+            <a:endParaRPr kumimoji="0" lang="ko-KR" altLang="en-US" b="1" i="0" u="none" strike="noStrike" cap="none" normalizeH="0" baseline="0" dirty="0" smtClean="0">
+              <a:ln>
+                <a:noFill/>
+              </a:ln>
+              <a:solidFill>
+                <a:srgbClr val="464517"/>
+              </a:solidFill>
+              <a:effectLst/>
+              <a:latin typeface="Goudy Old Style" panose="02020502050305020303" pitchFamily="18" charset="0"/>
+              <a:ea typeface="맑은 고딕" pitchFamily="50" charset="-127"/>
+            </a:endParaRPr>
+          </a:p>
+        </p:txBody>
+      </p:sp>
+      <p:cxnSp>
+        <p:nvCxnSpPr>
+          <p:cNvPr id="30" name="직선 화살표 연결선 29"/>
+          <p:cNvCxnSpPr>
+            <a:stCxn id="12" idx="2"/>
+            <a:endCxn id="14" idx="0"/>
+          </p:cNvCxnSpPr>
+          <p:nvPr/>
+        </p:nvCxnSpPr>
+        <p:spPr bwMode="auto">
+          <a:xfrm>
+            <a:off x="4311570" y="1736203"/>
+            <a:ext cx="1" cy="441767"/>
+          </a:xfrm>
+          <a:prstGeom prst="straightConnector1">
+            <a:avLst/>
+          </a:prstGeom>
+          <a:solidFill>
+            <a:schemeClr val="accent1"/>
+          </a:solidFill>
+          <a:ln w="12700" cap="flat" cmpd="sng" algn="ctr">
+            <a:solidFill>
+              <a:schemeClr val="tx1"/>
+            </a:solidFill>
+            <a:prstDash val="solid"/>
+            <a:round/>
+            <a:headEnd type="none" w="med" len="med"/>
+            <a:tailEnd type="triangle"/>
           </a:ln>
           <a:effectLst/>
-          <a:extLst>
-            <a:ext uri="{909E8E84-426E-40DD-AFC4-6F175D3DCCD1}">
-              <a14:hiddenFill xmlns:a14="http://schemas.microsoft.com/office/drawing/2010/main">
-                <a:solidFill>
-                  <a:schemeClr val="accent1"/>
-                </a:solidFill>
-              </a14:hiddenFill>
-            </a:ext>
-            <a:ext uri="{91240B29-F687-4F45-9708-019B960494DF}">
-              <a14:hiddenLine xmlns:a14="http://schemas.microsoft.com/office/drawing/2010/main" w="9525">
-                <a:solidFill>
-                  <a:schemeClr val="tx1"/>
-                </a:solidFill>
-                <a:miter lim="800000"/>
-                <a:headEnd/>
-                <a:tailEnd/>
-              </a14:hiddenLine>
-            </a:ext>
-            <a:ext uri="{AF507438-7753-43E0-B8FC-AC1667EBCBE1}">
-              <a14:hiddenEffects xmlns:a14="http://schemas.microsoft.com/office/drawing/2010/main">
-                <a:effectLst>
-                  <a:outerShdw dist="35921" dir="2700000" algn="ctr" rotWithShape="0">
-                    <a:schemeClr val="bg2"/>
-                  </a:outerShdw>
-                </a:effectLst>
-              </a14:hiddenEffects>
-            </a:ext>
-          </a:extLst>
         </p:spPr>
-      </p:pic>
+      </p:cxnSp>
+      <p:cxnSp>
+        <p:nvCxnSpPr>
+          <p:cNvPr id="36" name="직선 화살표 연결선 35"/>
+          <p:cNvCxnSpPr>
+            <a:stCxn id="14" idx="2"/>
+            <a:endCxn id="16" idx="0"/>
+          </p:cNvCxnSpPr>
+          <p:nvPr/>
+        </p:nvCxnSpPr>
+        <p:spPr bwMode="auto">
+          <a:xfrm flipH="1">
+            <a:off x="4311570" y="2733555"/>
+            <a:ext cx="1" cy="396012"/>
+          </a:xfrm>
+          <a:prstGeom prst="straightConnector1">
+            <a:avLst/>
+          </a:prstGeom>
+          <a:solidFill>
+            <a:schemeClr val="accent1"/>
+          </a:solidFill>
+          <a:ln w="12700" cap="flat" cmpd="sng" algn="ctr">
+            <a:solidFill>
+              <a:schemeClr val="tx1"/>
+            </a:solidFill>
+            <a:prstDash val="solid"/>
+            <a:round/>
+            <a:headEnd type="none" w="med" len="med"/>
+            <a:tailEnd type="triangle"/>
+          </a:ln>
+          <a:effectLst/>
+        </p:spPr>
+      </p:cxnSp>
+      <p:cxnSp>
+        <p:nvCxnSpPr>
+          <p:cNvPr id="38" name="직선 화살표 연결선 37"/>
+          <p:cNvCxnSpPr>
+            <a:stCxn id="14" idx="2"/>
+            <a:endCxn id="17" idx="0"/>
+          </p:cNvCxnSpPr>
+          <p:nvPr/>
+        </p:nvCxnSpPr>
+        <p:spPr bwMode="auto">
+          <a:xfrm flipH="1">
+            <a:off x="2517494" y="2733555"/>
+            <a:ext cx="1794077" cy="396013"/>
+          </a:xfrm>
+          <a:prstGeom prst="straightConnector1">
+            <a:avLst/>
+          </a:prstGeom>
+          <a:solidFill>
+            <a:schemeClr val="accent1"/>
+          </a:solidFill>
+          <a:ln w="12700" cap="flat" cmpd="sng" algn="ctr">
+            <a:solidFill>
+              <a:schemeClr val="tx1"/>
+            </a:solidFill>
+            <a:prstDash val="solid"/>
+            <a:round/>
+            <a:headEnd type="none" w="med" len="med"/>
+            <a:tailEnd type="triangle"/>
+          </a:ln>
+          <a:effectLst/>
+        </p:spPr>
+      </p:cxnSp>
+      <p:cxnSp>
+        <p:nvCxnSpPr>
+          <p:cNvPr id="40" name="직선 화살표 연결선 39"/>
+          <p:cNvCxnSpPr>
+            <a:stCxn id="14" idx="2"/>
+            <a:endCxn id="15" idx="0"/>
+          </p:cNvCxnSpPr>
+          <p:nvPr/>
+        </p:nvCxnSpPr>
+        <p:spPr bwMode="auto">
+          <a:xfrm>
+            <a:off x="4311571" y="2733555"/>
+            <a:ext cx="1794075" cy="396011"/>
+          </a:xfrm>
+          <a:prstGeom prst="straightConnector1">
+            <a:avLst/>
+          </a:prstGeom>
+          <a:solidFill>
+            <a:schemeClr val="accent1"/>
+          </a:solidFill>
+          <a:ln w="12700" cap="flat" cmpd="sng" algn="ctr">
+            <a:solidFill>
+              <a:schemeClr val="tx1"/>
+            </a:solidFill>
+            <a:prstDash val="solid"/>
+            <a:round/>
+            <a:headEnd type="none" w="med" len="med"/>
+            <a:tailEnd type="triangle"/>
+          </a:ln>
+          <a:effectLst/>
+        </p:spPr>
+      </p:cxnSp>
+      <p:cxnSp>
+        <p:nvCxnSpPr>
+          <p:cNvPr id="42" name="직선 화살표 연결선 41"/>
+          <p:cNvCxnSpPr>
+            <a:stCxn id="16" idx="2"/>
+            <a:endCxn id="18" idx="0"/>
+          </p:cNvCxnSpPr>
+          <p:nvPr/>
+        </p:nvCxnSpPr>
+        <p:spPr bwMode="auto">
+          <a:xfrm>
+            <a:off x="4311570" y="3565002"/>
+            <a:ext cx="1" cy="396012"/>
+          </a:xfrm>
+          <a:prstGeom prst="straightConnector1">
+            <a:avLst/>
+          </a:prstGeom>
+          <a:solidFill>
+            <a:schemeClr val="accent1"/>
+          </a:solidFill>
+          <a:ln w="12700" cap="flat" cmpd="sng" algn="ctr">
+            <a:solidFill>
+              <a:schemeClr val="tx1"/>
+            </a:solidFill>
+            <a:prstDash val="solid"/>
+            <a:round/>
+            <a:headEnd type="none" w="med" len="med"/>
+            <a:tailEnd type="triangle"/>
+          </a:ln>
+          <a:effectLst/>
+        </p:spPr>
+      </p:cxnSp>
+      <p:cxnSp>
+        <p:nvCxnSpPr>
+          <p:cNvPr id="50" name="직선 화살표 연결선 49"/>
+          <p:cNvCxnSpPr>
+            <a:stCxn id="18" idx="2"/>
+            <a:endCxn id="24" idx="0"/>
+          </p:cNvCxnSpPr>
+          <p:nvPr/>
+        </p:nvCxnSpPr>
+        <p:spPr bwMode="auto">
+          <a:xfrm flipH="1">
+            <a:off x="3414532" y="4398380"/>
+            <a:ext cx="897039" cy="394081"/>
+          </a:xfrm>
+          <a:prstGeom prst="straightConnector1">
+            <a:avLst/>
+          </a:prstGeom>
+          <a:solidFill>
+            <a:schemeClr val="accent1"/>
+          </a:solidFill>
+          <a:ln w="12700" cap="flat" cmpd="sng" algn="ctr">
+            <a:solidFill>
+              <a:schemeClr val="tx1"/>
+            </a:solidFill>
+            <a:prstDash val="solid"/>
+            <a:round/>
+            <a:headEnd type="none" w="med" len="med"/>
+            <a:tailEnd type="triangle"/>
+          </a:ln>
+          <a:effectLst/>
+        </p:spPr>
+      </p:cxnSp>
+      <p:cxnSp>
+        <p:nvCxnSpPr>
+          <p:cNvPr id="52" name="직선 화살표 연결선 51"/>
+          <p:cNvCxnSpPr>
+            <a:stCxn id="18" idx="2"/>
+            <a:endCxn id="23" idx="0"/>
+          </p:cNvCxnSpPr>
+          <p:nvPr/>
+        </p:nvCxnSpPr>
+        <p:spPr bwMode="auto">
+          <a:xfrm>
+            <a:off x="4311571" y="4398380"/>
+            <a:ext cx="924044" cy="353842"/>
+          </a:xfrm>
+          <a:prstGeom prst="straightConnector1">
+            <a:avLst/>
+          </a:prstGeom>
+          <a:solidFill>
+            <a:schemeClr val="accent1"/>
+          </a:solidFill>
+          <a:ln w="12700" cap="flat" cmpd="sng" algn="ctr">
+            <a:solidFill>
+              <a:schemeClr val="tx1"/>
+            </a:solidFill>
+            <a:prstDash val="solid"/>
+            <a:round/>
+            <a:headEnd type="none" w="med" len="med"/>
+            <a:tailEnd type="triangle"/>
+          </a:ln>
+          <a:effectLst/>
+        </p:spPr>
+      </p:cxnSp>
+      <p:cxnSp>
+        <p:nvCxnSpPr>
+          <p:cNvPr id="54" name="직선 화살표 연결선 53"/>
+          <p:cNvCxnSpPr>
+            <a:stCxn id="18" idx="2"/>
+            <a:endCxn id="25" idx="0"/>
+          </p:cNvCxnSpPr>
+          <p:nvPr/>
+        </p:nvCxnSpPr>
+        <p:spPr bwMode="auto">
+          <a:xfrm>
+            <a:off x="4311571" y="4398380"/>
+            <a:ext cx="2745127" cy="396282"/>
+          </a:xfrm>
+          <a:prstGeom prst="straightConnector1">
+            <a:avLst/>
+          </a:prstGeom>
+          <a:solidFill>
+            <a:schemeClr val="accent1"/>
+          </a:solidFill>
+          <a:ln w="12700" cap="flat" cmpd="sng" algn="ctr">
+            <a:solidFill>
+              <a:schemeClr val="tx1"/>
+            </a:solidFill>
+            <a:prstDash val="solid"/>
+            <a:round/>
+            <a:headEnd type="none" w="med" len="med"/>
+            <a:tailEnd type="triangle"/>
+          </a:ln>
+          <a:effectLst/>
+        </p:spPr>
+      </p:cxnSp>
+      <p:cxnSp>
+        <p:nvCxnSpPr>
+          <p:cNvPr id="56" name="직선 화살표 연결선 55"/>
+          <p:cNvCxnSpPr>
+            <a:stCxn id="18" idx="2"/>
+            <a:endCxn id="22" idx="0"/>
+          </p:cNvCxnSpPr>
+          <p:nvPr/>
+        </p:nvCxnSpPr>
+        <p:spPr bwMode="auto">
+          <a:xfrm flipH="1">
+            <a:off x="1593449" y="4398380"/>
+            <a:ext cx="2718122" cy="394080"/>
+          </a:xfrm>
+          <a:prstGeom prst="straightConnector1">
+            <a:avLst/>
+          </a:prstGeom>
+          <a:solidFill>
+            <a:schemeClr val="accent1"/>
+          </a:solidFill>
+          <a:ln w="12700" cap="flat" cmpd="sng" algn="ctr">
+            <a:solidFill>
+              <a:schemeClr val="tx1"/>
+            </a:solidFill>
+            <a:prstDash val="solid"/>
+            <a:round/>
+            <a:headEnd type="none" w="med" len="med"/>
+            <a:tailEnd type="triangle"/>
+          </a:ln>
+          <a:effectLst/>
+        </p:spPr>
+      </p:cxnSp>
+      <p:cxnSp>
+        <p:nvCxnSpPr>
+          <p:cNvPr id="58" name="직선 화살표 연결선 57"/>
+          <p:cNvCxnSpPr>
+            <a:stCxn id="25" idx="2"/>
+            <a:endCxn id="19" idx="0"/>
+          </p:cNvCxnSpPr>
+          <p:nvPr/>
+        </p:nvCxnSpPr>
+        <p:spPr bwMode="auto">
+          <a:xfrm>
+            <a:off x="7056698" y="5230097"/>
+            <a:ext cx="0" cy="399384"/>
+          </a:xfrm>
+          <a:prstGeom prst="straightConnector1">
+            <a:avLst/>
+          </a:prstGeom>
+          <a:solidFill>
+            <a:schemeClr val="accent1"/>
+          </a:solidFill>
+          <a:ln w="12700" cap="flat" cmpd="sng" algn="ctr">
+            <a:solidFill>
+              <a:schemeClr val="tx1"/>
+            </a:solidFill>
+            <a:prstDash val="solid"/>
+            <a:round/>
+            <a:headEnd type="none" w="med" len="med"/>
+            <a:tailEnd type="triangle"/>
+          </a:ln>
+          <a:effectLst/>
+        </p:spPr>
+      </p:cxnSp>
+      <p:cxnSp>
+        <p:nvCxnSpPr>
+          <p:cNvPr id="66" name="직선 화살표 연결선 65"/>
+          <p:cNvCxnSpPr>
+            <a:stCxn id="17" idx="2"/>
+            <a:endCxn id="17" idx="2"/>
+          </p:cNvCxnSpPr>
+          <p:nvPr/>
+        </p:nvCxnSpPr>
+        <p:spPr bwMode="auto">
+          <a:xfrm>
+            <a:off x="2517494" y="3565003"/>
+            <a:ext cx="0" cy="0"/>
+          </a:xfrm>
+          <a:prstGeom prst="straightConnector1">
+            <a:avLst/>
+          </a:prstGeom>
+          <a:solidFill>
+            <a:schemeClr val="accent1"/>
+          </a:solidFill>
+          <a:ln w="12700" cap="flat" cmpd="sng" algn="ctr">
+            <a:solidFill>
+              <a:schemeClr val="tx1"/>
+            </a:solidFill>
+            <a:prstDash val="solid"/>
+            <a:round/>
+            <a:headEnd type="none" w="med" len="med"/>
+            <a:tailEnd type="triangle"/>
+          </a:ln>
+          <a:effectLst/>
+        </p:spPr>
+      </p:cxnSp>
+      <p:cxnSp>
+        <p:nvCxnSpPr>
+          <p:cNvPr id="68" name="직선 화살표 연결선 67"/>
+          <p:cNvCxnSpPr>
+            <a:stCxn id="17" idx="2"/>
+            <a:endCxn id="18" idx="0"/>
+          </p:cNvCxnSpPr>
+          <p:nvPr/>
+        </p:nvCxnSpPr>
+        <p:spPr bwMode="auto">
+          <a:xfrm>
+            <a:off x="2517494" y="3565003"/>
+            <a:ext cx="1794077" cy="396011"/>
+          </a:xfrm>
+          <a:prstGeom prst="straightConnector1">
+            <a:avLst/>
+          </a:prstGeom>
+          <a:solidFill>
+            <a:schemeClr val="accent1"/>
+          </a:solidFill>
+          <a:ln w="12700" cap="flat" cmpd="sng" algn="ctr">
+            <a:solidFill>
+              <a:schemeClr val="tx1"/>
+            </a:solidFill>
+            <a:prstDash val="solid"/>
+            <a:round/>
+            <a:headEnd type="none" w="med" len="med"/>
+            <a:tailEnd type="triangle"/>
+          </a:ln>
+          <a:effectLst/>
+        </p:spPr>
+      </p:cxnSp>
+      <p:cxnSp>
+        <p:nvCxnSpPr>
+          <p:cNvPr id="71" name="직선 화살표 연결선 70"/>
+          <p:cNvCxnSpPr>
+            <a:stCxn id="15" idx="2"/>
+            <a:endCxn id="18" idx="0"/>
+          </p:cNvCxnSpPr>
+          <p:nvPr/>
+        </p:nvCxnSpPr>
+        <p:spPr bwMode="auto">
+          <a:xfrm flipH="1">
+            <a:off x="4311571" y="3565001"/>
+            <a:ext cx="1794075" cy="396013"/>
+          </a:xfrm>
+          <a:prstGeom prst="straightConnector1">
+            <a:avLst/>
+          </a:prstGeom>
+          <a:solidFill>
+            <a:schemeClr val="accent1"/>
+          </a:solidFill>
+          <a:ln w="12700" cap="flat" cmpd="sng" algn="ctr">
+            <a:solidFill>
+              <a:schemeClr val="tx1"/>
+            </a:solidFill>
+            <a:prstDash val="solid"/>
+            <a:round/>
+            <a:headEnd type="none" w="med" len="med"/>
+            <a:tailEnd type="triangle"/>
+          </a:ln>
+          <a:effectLst/>
+        </p:spPr>
+      </p:cxnSp>
     </p:spTree>
     <p:extLst>
       <p:ext uri="{BB962C8B-B14F-4D97-AF65-F5344CB8AC3E}">
@@ -5185,12 +8316,48 @@
             <a:tbl>
               <a:tblPr/>
               <a:tblGrid>
-                <a:gridCol w="1024554"/>
-                <a:gridCol w="2983884"/>
-                <a:gridCol w="1196090"/>
-                <a:gridCol w="1859283"/>
-                <a:gridCol w="597313"/>
-                <a:gridCol w="1272218"/>
+                <a:gridCol w="1024554">
+                  <a:extLst>
+                    <a:ext uri="{9D8B030D-6E8A-4147-A177-3AD203B41FA5}">
+                      <a16:colId xmlns:a16="http://schemas.microsoft.com/office/drawing/2014/main" val="20000"/>
+                    </a:ext>
+                  </a:extLst>
+                </a:gridCol>
+                <a:gridCol w="2983884">
+                  <a:extLst>
+                    <a:ext uri="{9D8B030D-6E8A-4147-A177-3AD203B41FA5}">
+                      <a16:colId xmlns:a16="http://schemas.microsoft.com/office/drawing/2014/main" val="20001"/>
+                    </a:ext>
+                  </a:extLst>
+                </a:gridCol>
+                <a:gridCol w="1196090">
+                  <a:extLst>
+                    <a:ext uri="{9D8B030D-6E8A-4147-A177-3AD203B41FA5}">
+                      <a16:colId xmlns:a16="http://schemas.microsoft.com/office/drawing/2014/main" val="20002"/>
+                    </a:ext>
+                  </a:extLst>
+                </a:gridCol>
+                <a:gridCol w="1859283">
+                  <a:extLst>
+                    <a:ext uri="{9D8B030D-6E8A-4147-A177-3AD203B41FA5}">
+                      <a16:colId xmlns:a16="http://schemas.microsoft.com/office/drawing/2014/main" val="20003"/>
+                    </a:ext>
+                  </a:extLst>
+                </a:gridCol>
+                <a:gridCol w="597313">
+                  <a:extLst>
+                    <a:ext uri="{9D8B030D-6E8A-4147-A177-3AD203B41FA5}">
+                      <a16:colId xmlns:a16="http://schemas.microsoft.com/office/drawing/2014/main" val="20004"/>
+                    </a:ext>
+                  </a:extLst>
+                </a:gridCol>
+                <a:gridCol w="1272218">
+                  <a:extLst>
+                    <a:ext uri="{9D8B030D-6E8A-4147-A177-3AD203B41FA5}">
+                      <a16:colId xmlns:a16="http://schemas.microsoft.com/office/drawing/2014/main" val="20005"/>
+                    </a:ext>
+                  </a:extLst>
+                </a:gridCol>
               </a:tblGrid>
               <a:tr h="299619">
                 <a:tc>
@@ -5707,6 +8874,11 @@
                     <a:noFill/>
                   </a:tcPr>
                 </a:tc>
+                <a:extLst>
+                  <a:ext uri="{0D108BD9-81ED-4DB2-BD59-A6C34878D82A}">
+                    <a16:rowId xmlns:a16="http://schemas.microsoft.com/office/drawing/2014/main" val="10000"/>
+                  </a:ext>
+                </a:extLst>
               </a:tr>
               <a:tr h="297106">
                 <a:tc>
@@ -6254,6 +9426,11 @@
                     <a:noFill/>
                   </a:tcPr>
                 </a:tc>
+                <a:extLst>
+                  <a:ext uri="{0D108BD9-81ED-4DB2-BD59-A6C34878D82A}">
+                    <a16:rowId xmlns:a16="http://schemas.microsoft.com/office/drawing/2014/main" val="10001"/>
+                  </a:ext>
+                </a:extLst>
               </a:tr>
               <a:tr h="297106">
                 <a:tc>
@@ -6759,6 +9936,11 @@
                     <a:noFill/>
                   </a:tcPr>
                 </a:tc>
+                <a:extLst>
+                  <a:ext uri="{0D108BD9-81ED-4DB2-BD59-A6C34878D82A}">
+                    <a16:rowId xmlns:a16="http://schemas.microsoft.com/office/drawing/2014/main" val="10002"/>
+                  </a:ext>
+                </a:extLst>
               </a:tr>
             </a:tbl>
           </a:graphicData>
@@ -7645,10 +10827,34 @@
                 <a:tableStyleId>{5940675A-B579-460E-94D1-54222C63F5DA}</a:tableStyleId>
               </a:tblPr>
               <a:tblGrid>
-                <a:gridCol w="504000"/>
-                <a:gridCol w="504000"/>
-                <a:gridCol w="1521016"/>
-                <a:gridCol w="1521016"/>
+                <a:gridCol w="504000">
+                  <a:extLst>
+                    <a:ext uri="{9D8B030D-6E8A-4147-A177-3AD203B41FA5}">
+                      <a16:colId xmlns:a16="http://schemas.microsoft.com/office/drawing/2014/main" val="20000"/>
+                    </a:ext>
+                  </a:extLst>
+                </a:gridCol>
+                <a:gridCol w="504000">
+                  <a:extLst>
+                    <a:ext uri="{9D8B030D-6E8A-4147-A177-3AD203B41FA5}">
+                      <a16:colId xmlns:a16="http://schemas.microsoft.com/office/drawing/2014/main" val="20001"/>
+                    </a:ext>
+                  </a:extLst>
+                </a:gridCol>
+                <a:gridCol w="1521016">
+                  <a:extLst>
+                    <a:ext uri="{9D8B030D-6E8A-4147-A177-3AD203B41FA5}">
+                      <a16:colId xmlns:a16="http://schemas.microsoft.com/office/drawing/2014/main" val="20002"/>
+                    </a:ext>
+                  </a:extLst>
+                </a:gridCol>
+                <a:gridCol w="1521016">
+                  <a:extLst>
+                    <a:ext uri="{9D8B030D-6E8A-4147-A177-3AD203B41FA5}">
+                      <a16:colId xmlns:a16="http://schemas.microsoft.com/office/drawing/2014/main" val="20003"/>
+                    </a:ext>
+                  </a:extLst>
+                </a:gridCol>
               </a:tblGrid>
               <a:tr h="301664">
                 <a:tc gridSpan="4">
@@ -7762,6 +10968,11 @@
                   </a:txBody>
                   <a:tcPr/>
                 </a:tc>
+                <a:extLst>
+                  <a:ext uri="{0D108BD9-81ED-4DB2-BD59-A6C34878D82A}">
+                    <a16:rowId xmlns:a16="http://schemas.microsoft.com/office/drawing/2014/main" val="10000"/>
+                  </a:ext>
+                </a:extLst>
               </a:tr>
               <a:tr h="238875">
                 <a:tc>
@@ -7920,6 +11131,11 @@
                     </a:solidFill>
                   </a:tcPr>
                 </a:tc>
+                <a:extLst>
+                  <a:ext uri="{0D108BD9-81ED-4DB2-BD59-A6C34878D82A}">
+                    <a16:rowId xmlns:a16="http://schemas.microsoft.com/office/drawing/2014/main" val="10001"/>
+                  </a:ext>
+                </a:extLst>
               </a:tr>
               <a:tr h="195561">
                 <a:tc>
@@ -8039,6 +11255,11 @@
                     </a:solidFill>
                   </a:tcPr>
                 </a:tc>
+                <a:extLst>
+                  <a:ext uri="{0D108BD9-81ED-4DB2-BD59-A6C34878D82A}">
+                    <a16:rowId xmlns:a16="http://schemas.microsoft.com/office/drawing/2014/main" val="10002"/>
+                  </a:ext>
+                </a:extLst>
               </a:tr>
               <a:tr h="195561">
                 <a:tc>
@@ -8191,6 +11412,11 @@
                     </a:solidFill>
                   </a:tcPr>
                 </a:tc>
+                <a:extLst>
+                  <a:ext uri="{0D108BD9-81ED-4DB2-BD59-A6C34878D82A}">
+                    <a16:rowId xmlns:a16="http://schemas.microsoft.com/office/drawing/2014/main" val="10003"/>
+                  </a:ext>
+                </a:extLst>
               </a:tr>
               <a:tr h="195561">
                 <a:tc>
@@ -8287,6 +11513,11 @@
                     </a:solidFill>
                   </a:tcPr>
                 </a:tc>
+                <a:extLst>
+                  <a:ext uri="{0D108BD9-81ED-4DB2-BD59-A6C34878D82A}">
+                    <a16:rowId xmlns:a16="http://schemas.microsoft.com/office/drawing/2014/main" val="10004"/>
+                  </a:ext>
+                </a:extLst>
               </a:tr>
             </a:tbl>
           </a:graphicData>
@@ -8601,12 +11832,48 @@
             <a:tbl>
               <a:tblPr/>
               <a:tblGrid>
-                <a:gridCol w="1024554"/>
-                <a:gridCol w="2983884"/>
-                <a:gridCol w="1196090"/>
-                <a:gridCol w="1859283"/>
-                <a:gridCol w="597313"/>
-                <a:gridCol w="1272218"/>
+                <a:gridCol w="1024554">
+                  <a:extLst>
+                    <a:ext uri="{9D8B030D-6E8A-4147-A177-3AD203B41FA5}">
+                      <a16:colId xmlns:a16="http://schemas.microsoft.com/office/drawing/2014/main" val="20000"/>
+                    </a:ext>
+                  </a:extLst>
+                </a:gridCol>
+                <a:gridCol w="2983884">
+                  <a:extLst>
+                    <a:ext uri="{9D8B030D-6E8A-4147-A177-3AD203B41FA5}">
+                      <a16:colId xmlns:a16="http://schemas.microsoft.com/office/drawing/2014/main" val="20001"/>
+                    </a:ext>
+                  </a:extLst>
+                </a:gridCol>
+                <a:gridCol w="1196090">
+                  <a:extLst>
+                    <a:ext uri="{9D8B030D-6E8A-4147-A177-3AD203B41FA5}">
+                      <a16:colId xmlns:a16="http://schemas.microsoft.com/office/drawing/2014/main" val="20002"/>
+                    </a:ext>
+                  </a:extLst>
+                </a:gridCol>
+                <a:gridCol w="1859283">
+                  <a:extLst>
+                    <a:ext uri="{9D8B030D-6E8A-4147-A177-3AD203B41FA5}">
+                      <a16:colId xmlns:a16="http://schemas.microsoft.com/office/drawing/2014/main" val="20003"/>
+                    </a:ext>
+                  </a:extLst>
+                </a:gridCol>
+                <a:gridCol w="597313">
+                  <a:extLst>
+                    <a:ext uri="{9D8B030D-6E8A-4147-A177-3AD203B41FA5}">
+                      <a16:colId xmlns:a16="http://schemas.microsoft.com/office/drawing/2014/main" val="20004"/>
+                    </a:ext>
+                  </a:extLst>
+                </a:gridCol>
+                <a:gridCol w="1272218">
+                  <a:extLst>
+                    <a:ext uri="{9D8B030D-6E8A-4147-A177-3AD203B41FA5}">
+                      <a16:colId xmlns:a16="http://schemas.microsoft.com/office/drawing/2014/main" val="20005"/>
+                    </a:ext>
+                  </a:extLst>
+                </a:gridCol>
               </a:tblGrid>
               <a:tr h="299619">
                 <a:tc>
@@ -9123,6 +12390,11 @@
                     <a:noFill/>
                   </a:tcPr>
                 </a:tc>
+                <a:extLst>
+                  <a:ext uri="{0D108BD9-81ED-4DB2-BD59-A6C34878D82A}">
+                    <a16:rowId xmlns:a16="http://schemas.microsoft.com/office/drawing/2014/main" val="10000"/>
+                  </a:ext>
+                </a:extLst>
               </a:tr>
               <a:tr h="297106">
                 <a:tc>
@@ -9670,6 +12942,11 @@
                     <a:noFill/>
                   </a:tcPr>
                 </a:tc>
+                <a:extLst>
+                  <a:ext uri="{0D108BD9-81ED-4DB2-BD59-A6C34878D82A}">
+                    <a16:rowId xmlns:a16="http://schemas.microsoft.com/office/drawing/2014/main" val="10001"/>
+                  </a:ext>
+                </a:extLst>
               </a:tr>
               <a:tr h="297106">
                 <a:tc>
@@ -10175,6 +13452,11 @@
                     <a:noFill/>
                   </a:tcPr>
                 </a:tc>
+                <a:extLst>
+                  <a:ext uri="{0D108BD9-81ED-4DB2-BD59-A6C34878D82A}">
+                    <a16:rowId xmlns:a16="http://schemas.microsoft.com/office/drawing/2014/main" val="10002"/>
+                  </a:ext>
+                </a:extLst>
               </a:tr>
             </a:tbl>
           </a:graphicData>

</xml_diff>